<commit_message>
added a particle effect (ripped off from teleporting) and a sound when you spawn with bamfuslicator, allow teleport sound to be used as a tent
</commit_message>
<xml_diff>
--- a/docs/3-29-24 GlosGameDevs.pptx
+++ b/docs/3-29-24 GlosGameDevs.pptx
@@ -6,6 +6,14 @@
   </p:sldMasterIdLst>
   <p:sldIdLst>
     <p:sldId id="256" r:id="rId2"/>
+    <p:sldId id="257" r:id="rId3"/>
+    <p:sldId id="258" r:id="rId4"/>
+    <p:sldId id="262" r:id="rId5"/>
+    <p:sldId id="259" r:id="rId6"/>
+    <p:sldId id="260" r:id="rId7"/>
+    <p:sldId id="263" r:id="rId8"/>
+    <p:sldId id="264" r:id="rId9"/>
+    <p:sldId id="261" r:id="rId10"/>
   </p:sldIdLst>
   <p:sldSz cx="12192000" cy="6858000"/>
   <p:notesSz cx="6858000" cy="9144000"/>
@@ -104,6 +112,11 @@
       </a:defRPr>
     </a:lvl9pPr>
   </p:defaultTextStyle>
+  <p:extLst>
+    <p:ext uri="{EFAFB233-063F-42B5-8137-9DF3F51BA10A}">
+      <p15:sldGuideLst xmlns:p15="http://schemas.microsoft.com/office/powerpoint/2012/main"/>
+    </p:ext>
+  </p:extLst>
 </p:presentation>
 </file>
 
@@ -132,7 +145,7 @@
         </p:nvGrpSpPr>
         <p:grpSpPr>
           <a:xfrm>
-            <a:off x="0" y="-8467"/>
+            <a:off x="-4737" y="56846"/>
             <a:ext cx="12192000" cy="6866467"/>
             <a:chOff x="0" y="-8467"/>
             <a:chExt cx="12192000" cy="6866467"/>
@@ -685,10 +698,9 @@
           </a:lstStyle>
           <a:p>
             <a:r>
-              <a:rPr lang="en-US"/>
+              <a:rPr lang="en-US" dirty="0"/>
               <a:t>Click to edit Master title style</a:t>
             </a:r>
-            <a:endParaRPr lang="en-US" dirty="0"/>
           </a:p>
         </p:txBody>
       </p:sp>
@@ -812,68 +824,80 @@
           </a:p>
         </p:txBody>
       </p:sp>
-      <p:sp>
-        <p:nvSpPr>
-          <p:cNvPr id="4" name="Date Placeholder 3"/>
-          <p:cNvSpPr>
-            <a:spLocks noGrp="1"/>
-          </p:cNvSpPr>
-          <p:nvPr>
-            <p:ph type="dt" sz="half" idx="10"/>
-          </p:nvPr>
-        </p:nvSpPr>
-        <p:spPr/>
-        <p:txBody>
-          <a:bodyPr/>
-          <a:lstStyle/>
-          <a:p>
-            <a:fld id="{C42A3D91-6356-4AF1-BC75-05775A6D11B7}" type="datetimeFigureOut">
-              <a:rPr lang="en-GB" smtClean="0"/>
-              <a:t>22/03/2024</a:t>
-            </a:fld>
-            <a:endParaRPr lang="en-GB"/>
-          </a:p>
-        </p:txBody>
-      </p:sp>
-      <p:sp>
-        <p:nvSpPr>
-          <p:cNvPr id="5" name="Footer Placeholder 4"/>
-          <p:cNvSpPr>
-            <a:spLocks noGrp="1"/>
-          </p:cNvSpPr>
-          <p:nvPr>
-            <p:ph type="ftr" sz="quarter" idx="11"/>
-          </p:nvPr>
-        </p:nvSpPr>
-        <p:spPr/>
-        <p:txBody>
-          <a:bodyPr/>
-          <a:lstStyle/>
-          <a:p>
-            <a:endParaRPr lang="en-GB"/>
-          </a:p>
-        </p:txBody>
-      </p:sp>
-      <p:sp>
-        <p:nvSpPr>
-          <p:cNvPr id="6" name="Slide Number Placeholder 5"/>
-          <p:cNvSpPr>
-            <a:spLocks noGrp="1"/>
-          </p:cNvSpPr>
-          <p:nvPr>
-            <p:ph type="sldNum" sz="quarter" idx="12"/>
-          </p:nvPr>
-        </p:nvSpPr>
-        <p:spPr/>
-        <p:txBody>
-          <a:bodyPr/>
-          <a:lstStyle/>
-          <a:p>
-            <a:fld id="{6B2318DD-BA68-46EF-9FF3-923F12CD4E36}" type="slidenum">
-              <a:rPr lang="en-GB" smtClean="0"/>
-              <a:t>‹#›</a:t>
-            </a:fld>
-            <a:endParaRPr lang="en-GB"/>
+      <p:pic>
+        <p:nvPicPr>
+          <p:cNvPr id="9" name="Picture 8">
+            <a:extLst>
+              <a:ext uri="{FF2B5EF4-FFF2-40B4-BE49-F238E27FC236}">
+                <a16:creationId xmlns:a16="http://schemas.microsoft.com/office/drawing/2014/main" id="{CF104AA0-0A69-784A-DDDC-BA89A97AC57F}"/>
+              </a:ext>
+            </a:extLst>
+          </p:cNvPr>
+          <p:cNvPicPr>
+            <a:picLocks noChangeAspect="1"/>
+          </p:cNvPicPr>
+          <p:nvPr userDrawn="1"/>
+        </p:nvPicPr>
+        <p:blipFill>
+          <a:blip r:embed="rId2">
+            <a:extLst>
+              <a:ext uri="{28A0092B-C50C-407E-A947-70E740481C1C}">
+                <a14:useLocalDpi xmlns:a14="http://schemas.microsoft.com/office/drawing/2010/main" val="0"/>
+              </a:ext>
+            </a:extLst>
+          </a:blip>
+          <a:stretch>
+            <a:fillRect/>
+          </a:stretch>
+        </p:blipFill>
+        <p:spPr>
+          <a:xfrm>
+            <a:off x="545674" y="5765497"/>
+            <a:ext cx="3289055" cy="1096900"/>
+          </a:xfrm>
+          <a:prstGeom prst="rect">
+            <a:avLst/>
+          </a:prstGeom>
+        </p:spPr>
+      </p:pic>
+      <p:sp>
+        <p:nvSpPr>
+          <p:cNvPr id="10" name="TextBox 9">
+            <a:extLst>
+              <a:ext uri="{FF2B5EF4-FFF2-40B4-BE49-F238E27FC236}">
+                <a16:creationId xmlns:a16="http://schemas.microsoft.com/office/drawing/2014/main" id="{18B9699A-CA5F-09A9-0C30-13F476A9B813}"/>
+              </a:ext>
+            </a:extLst>
+          </p:cNvPr>
+          <p:cNvSpPr txBox="1"/>
+          <p:nvPr userDrawn="1"/>
+        </p:nvSpPr>
+        <p:spPr>
+          <a:xfrm>
+            <a:off x="5993437" y="6083114"/>
+            <a:ext cx="3725848" cy="461665"/>
+          </a:xfrm>
+          <a:prstGeom prst="rect">
+            <a:avLst/>
+          </a:prstGeom>
+          <a:noFill/>
+        </p:spPr>
+        <p:txBody>
+          <a:bodyPr wrap="square" rtlCol="0">
+            <a:spAutoFit/>
+          </a:bodyPr>
+          <a:lstStyle/>
+          <a:p>
+            <a:r>
+              <a:rPr lang="en-GB" sz="2400" dirty="0">
+                <a:hlinkClick r:id="rId3"/>
+              </a:rPr>
+              <a:t>https://zombono.com/</a:t>
+            </a:r>
+            <a:r>
+              <a:rPr lang="en-GB" sz="2400" dirty="0"/>
+              <a:t> </a:t>
+            </a:r>
           </a:p>
         </p:txBody>
       </p:sp>
@@ -919,7 +943,7 @@
         </p:nvSpPr>
         <p:spPr>
           <a:xfrm>
-            <a:off x="677335" y="609600"/>
+            <a:off x="677334" y="234389"/>
             <a:ext cx="8596668" cy="3403600"/>
           </a:xfrm>
         </p:spPr>
@@ -953,7 +977,7 @@
         </p:nvSpPr>
         <p:spPr>
           <a:xfrm>
-            <a:off x="677335" y="4470400"/>
+            <a:off x="677334" y="3996602"/>
             <a:ext cx="8596668" cy="1570962"/>
           </a:xfrm>
         </p:spPr>
@@ -1080,7 +1104,7 @@
           <a:p>
             <a:fld id="{C42A3D91-6356-4AF1-BC75-05775A6D11B7}" type="datetimeFigureOut">
               <a:rPr lang="en-GB" smtClean="0"/>
-              <a:t>22/03/2024</a:t>
+              <a:t>27/03/2024</a:t>
             </a:fld>
             <a:endParaRPr lang="en-GB"/>
           </a:p>
@@ -1125,6 +1149,83 @@
               <a:t>‹#›</a:t>
             </a:fld>
             <a:endParaRPr lang="en-GB"/>
+          </a:p>
+        </p:txBody>
+      </p:sp>
+      <p:pic>
+        <p:nvPicPr>
+          <p:cNvPr id="11" name="Picture 10">
+            <a:extLst>
+              <a:ext uri="{FF2B5EF4-FFF2-40B4-BE49-F238E27FC236}">
+                <a16:creationId xmlns:a16="http://schemas.microsoft.com/office/drawing/2014/main" id="{57051875-EE07-C31F-28A1-A82F7F62CB9C}"/>
+              </a:ext>
+            </a:extLst>
+          </p:cNvPr>
+          <p:cNvPicPr>
+            <a:picLocks noChangeAspect="1"/>
+          </p:cNvPicPr>
+          <p:nvPr userDrawn="1"/>
+        </p:nvPicPr>
+        <p:blipFill>
+          <a:blip r:embed="rId2">
+            <a:extLst>
+              <a:ext uri="{28A0092B-C50C-407E-A947-70E740481C1C}">
+                <a14:useLocalDpi xmlns:a14="http://schemas.microsoft.com/office/drawing/2010/main" val="0"/>
+              </a:ext>
+            </a:extLst>
+          </a:blip>
+          <a:stretch>
+            <a:fillRect/>
+          </a:stretch>
+        </p:blipFill>
+        <p:spPr>
+          <a:xfrm>
+            <a:off x="677334" y="5761100"/>
+            <a:ext cx="3289055" cy="1096900"/>
+          </a:xfrm>
+          <a:prstGeom prst="rect">
+            <a:avLst/>
+          </a:prstGeom>
+        </p:spPr>
+      </p:pic>
+      <p:sp>
+        <p:nvSpPr>
+          <p:cNvPr id="12" name="TextBox 11">
+            <a:extLst>
+              <a:ext uri="{FF2B5EF4-FFF2-40B4-BE49-F238E27FC236}">
+                <a16:creationId xmlns:a16="http://schemas.microsoft.com/office/drawing/2014/main" id="{B5D817AE-86C8-0CBE-2BC1-9B9FAA602A5A}"/>
+              </a:ext>
+            </a:extLst>
+          </p:cNvPr>
+          <p:cNvSpPr txBox="1"/>
+          <p:nvPr userDrawn="1"/>
+        </p:nvSpPr>
+        <p:spPr>
+          <a:xfrm>
+            <a:off x="6096000" y="6078717"/>
+            <a:ext cx="3725848" cy="461665"/>
+          </a:xfrm>
+          <a:prstGeom prst="rect">
+            <a:avLst/>
+          </a:prstGeom>
+          <a:noFill/>
+        </p:spPr>
+        <p:txBody>
+          <a:bodyPr wrap="square" rtlCol="0">
+            <a:spAutoFit/>
+          </a:bodyPr>
+          <a:lstStyle/>
+          <a:p>
+            <a:r>
+              <a:rPr lang="en-GB" sz="2400" dirty="0">
+                <a:hlinkClick r:id="rId3"/>
+              </a:rPr>
+              <a:t>https://zombono.com/</a:t>
+            </a:r>
+            <a:r>
+              <a:rPr lang="en-GB" sz="2400" dirty="0"/>
+              <a:t> </a:t>
+            </a:r>
           </a:p>
         </p:txBody>
       </p:sp>
@@ -1267,7 +1368,7 @@
         </p:nvSpPr>
         <p:spPr>
           <a:xfrm>
-            <a:off x="677335" y="4470400"/>
+            <a:off x="680067" y="4181313"/>
             <a:ext cx="8596668" cy="1570962"/>
           </a:xfrm>
         </p:spPr>
@@ -1394,7 +1495,7 @@
           <a:p>
             <a:fld id="{C42A3D91-6356-4AF1-BC75-05775A6D11B7}" type="datetimeFigureOut">
               <a:rPr lang="en-GB" smtClean="0"/>
-              <a:t>22/03/2024</a:t>
+              <a:t>27/03/2024</a:t>
             </a:fld>
             <a:endParaRPr lang="en-GB"/>
           </a:p>
@@ -1529,6 +1630,83 @@
               </a:solidFill>
               <a:latin typeface="Arial"/>
             </a:endParaRPr>
+          </a:p>
+        </p:txBody>
+      </p:sp>
+      <p:pic>
+        <p:nvPicPr>
+          <p:cNvPr id="11" name="Picture 10">
+            <a:extLst>
+              <a:ext uri="{FF2B5EF4-FFF2-40B4-BE49-F238E27FC236}">
+                <a16:creationId xmlns:a16="http://schemas.microsoft.com/office/drawing/2014/main" id="{EAD6EA3B-EC77-0CEA-46E4-02178C83215A}"/>
+              </a:ext>
+            </a:extLst>
+          </p:cNvPr>
+          <p:cNvPicPr>
+            <a:picLocks noChangeAspect="1"/>
+          </p:cNvPicPr>
+          <p:nvPr userDrawn="1"/>
+        </p:nvPicPr>
+        <p:blipFill>
+          <a:blip r:embed="rId2">
+            <a:extLst>
+              <a:ext uri="{28A0092B-C50C-407E-A947-70E740481C1C}">
+                <a14:useLocalDpi xmlns:a14="http://schemas.microsoft.com/office/drawing/2010/main" val="0"/>
+              </a:ext>
+            </a:extLst>
+          </a:blip>
+          <a:stretch>
+            <a:fillRect/>
+          </a:stretch>
+        </p:blipFill>
+        <p:spPr>
+          <a:xfrm>
+            <a:off x="677334" y="5761100"/>
+            <a:ext cx="3289055" cy="1096900"/>
+          </a:xfrm>
+          <a:prstGeom prst="rect">
+            <a:avLst/>
+          </a:prstGeom>
+        </p:spPr>
+      </p:pic>
+      <p:sp>
+        <p:nvSpPr>
+          <p:cNvPr id="12" name="TextBox 11">
+            <a:extLst>
+              <a:ext uri="{FF2B5EF4-FFF2-40B4-BE49-F238E27FC236}">
+                <a16:creationId xmlns:a16="http://schemas.microsoft.com/office/drawing/2014/main" id="{6A72AF96-D2CB-956B-4F54-33B2B778F762}"/>
+              </a:ext>
+            </a:extLst>
+          </p:cNvPr>
+          <p:cNvSpPr txBox="1"/>
+          <p:nvPr userDrawn="1"/>
+        </p:nvSpPr>
+        <p:spPr>
+          <a:xfrm>
+            <a:off x="6096000" y="6078717"/>
+            <a:ext cx="3725848" cy="461665"/>
+          </a:xfrm>
+          <a:prstGeom prst="rect">
+            <a:avLst/>
+          </a:prstGeom>
+          <a:noFill/>
+        </p:spPr>
+        <p:txBody>
+          <a:bodyPr wrap="square" rtlCol="0">
+            <a:spAutoFit/>
+          </a:bodyPr>
+          <a:lstStyle/>
+          <a:p>
+            <a:r>
+              <a:rPr lang="en-GB" sz="2400" dirty="0">
+                <a:hlinkClick r:id="rId3"/>
+              </a:rPr>
+              <a:t>https://zombono.com/</a:t>
+            </a:r>
+            <a:r>
+              <a:rPr lang="en-GB" sz="2400" dirty="0"/>
+              <a:t> </a:t>
+            </a:r>
           </a:p>
         </p:txBody>
       </p:sp>
@@ -1574,7 +1752,7 @@
         </p:nvSpPr>
         <p:spPr>
           <a:xfrm>
-            <a:off x="677335" y="1931988"/>
+            <a:off x="736058" y="1084700"/>
             <a:ext cx="8596668" cy="2595460"/>
           </a:xfrm>
         </p:spPr>
@@ -1608,7 +1786,7 @@
         </p:nvSpPr>
         <p:spPr>
           <a:xfrm>
-            <a:off x="677335" y="4527448"/>
+            <a:off x="736058" y="3680160"/>
             <a:ext cx="8596668" cy="1513914"/>
           </a:xfrm>
         </p:spPr>
@@ -1735,7 +1913,7 @@
           <a:p>
             <a:fld id="{C42A3D91-6356-4AF1-BC75-05775A6D11B7}" type="datetimeFigureOut">
               <a:rPr lang="en-GB" smtClean="0"/>
-              <a:t>22/03/2024</a:t>
+              <a:t>27/03/2024</a:t>
             </a:fld>
             <a:endParaRPr lang="en-GB"/>
           </a:p>
@@ -1780,6 +1958,83 @@
               <a:t>‹#›</a:t>
             </a:fld>
             <a:endParaRPr lang="en-GB"/>
+          </a:p>
+        </p:txBody>
+      </p:sp>
+      <p:pic>
+        <p:nvPicPr>
+          <p:cNvPr id="9" name="Picture 8">
+            <a:extLst>
+              <a:ext uri="{FF2B5EF4-FFF2-40B4-BE49-F238E27FC236}">
+                <a16:creationId xmlns:a16="http://schemas.microsoft.com/office/drawing/2014/main" id="{0669F877-2E00-F718-D9CF-10398B566965}"/>
+              </a:ext>
+            </a:extLst>
+          </p:cNvPr>
+          <p:cNvPicPr>
+            <a:picLocks noChangeAspect="1"/>
+          </p:cNvPicPr>
+          <p:nvPr userDrawn="1"/>
+        </p:nvPicPr>
+        <p:blipFill>
+          <a:blip r:embed="rId2">
+            <a:extLst>
+              <a:ext uri="{28A0092B-C50C-407E-A947-70E740481C1C}">
+                <a14:useLocalDpi xmlns:a14="http://schemas.microsoft.com/office/drawing/2010/main" val="0"/>
+              </a:ext>
+            </a:extLst>
+          </a:blip>
+          <a:stretch>
+            <a:fillRect/>
+          </a:stretch>
+        </p:blipFill>
+        <p:spPr>
+          <a:xfrm>
+            <a:off x="677334" y="5761100"/>
+            <a:ext cx="3289055" cy="1096900"/>
+          </a:xfrm>
+          <a:prstGeom prst="rect">
+            <a:avLst/>
+          </a:prstGeom>
+        </p:spPr>
+      </p:pic>
+      <p:sp>
+        <p:nvSpPr>
+          <p:cNvPr id="10" name="TextBox 9">
+            <a:extLst>
+              <a:ext uri="{FF2B5EF4-FFF2-40B4-BE49-F238E27FC236}">
+                <a16:creationId xmlns:a16="http://schemas.microsoft.com/office/drawing/2014/main" id="{0C67F884-ADBC-CC0E-7367-EC2D64D2B5DD}"/>
+              </a:ext>
+            </a:extLst>
+          </p:cNvPr>
+          <p:cNvSpPr txBox="1"/>
+          <p:nvPr userDrawn="1"/>
+        </p:nvSpPr>
+        <p:spPr>
+          <a:xfrm>
+            <a:off x="6096000" y="6078717"/>
+            <a:ext cx="3725848" cy="461665"/>
+          </a:xfrm>
+          <a:prstGeom prst="rect">
+            <a:avLst/>
+          </a:prstGeom>
+          <a:noFill/>
+        </p:spPr>
+        <p:txBody>
+          <a:bodyPr wrap="square" rtlCol="0">
+            <a:spAutoFit/>
+          </a:bodyPr>
+          <a:lstStyle/>
+          <a:p>
+            <a:r>
+              <a:rPr lang="en-GB" sz="2400" dirty="0">
+                <a:hlinkClick r:id="rId3"/>
+              </a:rPr>
+              <a:t>https://zombono.com/</a:t>
+            </a:r>
+            <a:r>
+              <a:rPr lang="en-GB" sz="2400" dirty="0"/>
+              <a:t> </a:t>
+            </a:r>
           </a:p>
         </p:txBody>
       </p:sp>
@@ -1825,7 +2080,7 @@
         </p:nvSpPr>
         <p:spPr>
           <a:xfrm>
-            <a:off x="931334" y="609600"/>
+            <a:off x="931336" y="234389"/>
             <a:ext cx="8094134" cy="3022600"/>
           </a:xfrm>
         </p:spPr>
@@ -1859,7 +2114,7 @@
         </p:nvSpPr>
         <p:spPr>
           <a:xfrm>
-            <a:off x="677332" y="4013200"/>
+            <a:off x="677334" y="3637989"/>
             <a:ext cx="8596669" cy="514248"/>
           </a:xfrm>
         </p:spPr>
@@ -1922,7 +2177,7 @@
         </p:nvSpPr>
         <p:spPr>
           <a:xfrm>
-            <a:off x="677335" y="4527448"/>
+            <a:off x="677337" y="4152237"/>
             <a:ext cx="8596668" cy="1513914"/>
           </a:xfrm>
         </p:spPr>
@@ -2049,7 +2304,7 @@
           <a:p>
             <a:fld id="{C42A3D91-6356-4AF1-BC75-05775A6D11B7}" type="datetimeFigureOut">
               <a:rPr lang="en-GB" smtClean="0"/>
-              <a:t>22/03/2024</a:t>
+              <a:t>27/03/2024</a:t>
             </a:fld>
             <a:endParaRPr lang="en-GB"/>
           </a:p>
@@ -2105,7 +2360,7 @@
         </p:nvSpPr>
         <p:spPr>
           <a:xfrm>
-            <a:off x="541870" y="790378"/>
+            <a:off x="460410" y="295428"/>
             <a:ext cx="609600" cy="584776"/>
           </a:xfrm>
           <a:prstGeom prst="rect">
@@ -2146,7 +2401,7 @@
         </p:nvSpPr>
         <p:spPr>
           <a:xfrm>
-            <a:off x="8893011" y="2886556"/>
+            <a:off x="8969202" y="3053213"/>
             <a:ext cx="609600" cy="584776"/>
           </a:xfrm>
           <a:prstGeom prst="rect">
@@ -2175,6 +2430,83 @@
                 <a:latin typeface="Arial"/>
               </a:rPr>
               <a:t>”</a:t>
+            </a:r>
+          </a:p>
+        </p:txBody>
+      </p:sp>
+      <p:pic>
+        <p:nvPicPr>
+          <p:cNvPr id="9" name="Picture 8">
+            <a:extLst>
+              <a:ext uri="{FF2B5EF4-FFF2-40B4-BE49-F238E27FC236}">
+                <a16:creationId xmlns:a16="http://schemas.microsoft.com/office/drawing/2014/main" id="{6C5486A5-93AC-BFBA-1380-E665A8D01C48}"/>
+              </a:ext>
+            </a:extLst>
+          </p:cNvPr>
+          <p:cNvPicPr>
+            <a:picLocks noChangeAspect="1"/>
+          </p:cNvPicPr>
+          <p:nvPr userDrawn="1"/>
+        </p:nvPicPr>
+        <p:blipFill>
+          <a:blip r:embed="rId2">
+            <a:extLst>
+              <a:ext uri="{28A0092B-C50C-407E-A947-70E740481C1C}">
+                <a14:useLocalDpi xmlns:a14="http://schemas.microsoft.com/office/drawing/2010/main" val="0"/>
+              </a:ext>
+            </a:extLst>
+          </a:blip>
+          <a:stretch>
+            <a:fillRect/>
+          </a:stretch>
+        </p:blipFill>
+        <p:spPr>
+          <a:xfrm>
+            <a:off x="677334" y="5761100"/>
+            <a:ext cx="3289055" cy="1096900"/>
+          </a:xfrm>
+          <a:prstGeom prst="rect">
+            <a:avLst/>
+          </a:prstGeom>
+        </p:spPr>
+      </p:pic>
+      <p:sp>
+        <p:nvSpPr>
+          <p:cNvPr id="10" name="TextBox 9">
+            <a:extLst>
+              <a:ext uri="{FF2B5EF4-FFF2-40B4-BE49-F238E27FC236}">
+                <a16:creationId xmlns:a16="http://schemas.microsoft.com/office/drawing/2014/main" id="{F6BAFD8A-2DC2-1AE6-A68A-4DD25AD6DA8A}"/>
+              </a:ext>
+            </a:extLst>
+          </p:cNvPr>
+          <p:cNvSpPr txBox="1"/>
+          <p:nvPr userDrawn="1"/>
+        </p:nvSpPr>
+        <p:spPr>
+          <a:xfrm>
+            <a:off x="6096000" y="6078717"/>
+            <a:ext cx="3725848" cy="461665"/>
+          </a:xfrm>
+          <a:prstGeom prst="rect">
+            <a:avLst/>
+          </a:prstGeom>
+          <a:noFill/>
+        </p:spPr>
+        <p:txBody>
+          <a:bodyPr wrap="square" rtlCol="0">
+            <a:spAutoFit/>
+          </a:bodyPr>
+          <a:lstStyle/>
+          <a:p>
+            <a:r>
+              <a:rPr lang="en-GB" sz="2400" dirty="0">
+                <a:hlinkClick r:id="rId3"/>
+              </a:rPr>
+              <a:t>https://zombono.com/</a:t>
+            </a:r>
+            <a:r>
+              <a:rPr lang="en-GB" sz="2400" dirty="0"/>
+              <a:t> </a:t>
             </a:r>
           </a:p>
         </p:txBody>
@@ -2221,7 +2553,7 @@
         </p:nvSpPr>
         <p:spPr>
           <a:xfrm>
-            <a:off x="685799" y="609600"/>
+            <a:off x="685801" y="234389"/>
             <a:ext cx="8588203" cy="3022600"/>
           </a:xfrm>
         </p:spPr>
@@ -2255,7 +2587,7 @@
         </p:nvSpPr>
         <p:spPr>
           <a:xfrm>
-            <a:off x="677332" y="4013200"/>
+            <a:off x="677334" y="3637989"/>
             <a:ext cx="8596669" cy="514248"/>
           </a:xfrm>
         </p:spPr>
@@ -2315,7 +2647,7 @@
         </p:nvSpPr>
         <p:spPr>
           <a:xfrm>
-            <a:off x="677335" y="4527448"/>
+            <a:off x="677337" y="4152237"/>
             <a:ext cx="8596668" cy="1513914"/>
           </a:xfrm>
         </p:spPr>
@@ -2442,7 +2774,7 @@
           <a:p>
             <a:fld id="{C42A3D91-6356-4AF1-BC75-05775A6D11B7}" type="datetimeFigureOut">
               <a:rPr lang="en-GB" smtClean="0"/>
-              <a:t>22/03/2024</a:t>
+              <a:t>27/03/2024</a:t>
             </a:fld>
             <a:endParaRPr lang="en-GB"/>
           </a:p>
@@ -2487,6 +2819,83 @@
               <a:t>‹#›</a:t>
             </a:fld>
             <a:endParaRPr lang="en-GB"/>
+          </a:p>
+        </p:txBody>
+      </p:sp>
+      <p:pic>
+        <p:nvPicPr>
+          <p:cNvPr id="9" name="Picture 8">
+            <a:extLst>
+              <a:ext uri="{FF2B5EF4-FFF2-40B4-BE49-F238E27FC236}">
+                <a16:creationId xmlns:a16="http://schemas.microsoft.com/office/drawing/2014/main" id="{3692F284-5972-7957-CEE0-B96A30BC7D4B}"/>
+              </a:ext>
+            </a:extLst>
+          </p:cNvPr>
+          <p:cNvPicPr>
+            <a:picLocks noChangeAspect="1"/>
+          </p:cNvPicPr>
+          <p:nvPr userDrawn="1"/>
+        </p:nvPicPr>
+        <p:blipFill>
+          <a:blip r:embed="rId2">
+            <a:extLst>
+              <a:ext uri="{28A0092B-C50C-407E-A947-70E740481C1C}">
+                <a14:useLocalDpi xmlns:a14="http://schemas.microsoft.com/office/drawing/2010/main" val="0"/>
+              </a:ext>
+            </a:extLst>
+          </a:blip>
+          <a:stretch>
+            <a:fillRect/>
+          </a:stretch>
+        </p:blipFill>
+        <p:spPr>
+          <a:xfrm>
+            <a:off x="677334" y="5761100"/>
+            <a:ext cx="3289055" cy="1096900"/>
+          </a:xfrm>
+          <a:prstGeom prst="rect">
+            <a:avLst/>
+          </a:prstGeom>
+        </p:spPr>
+      </p:pic>
+      <p:sp>
+        <p:nvSpPr>
+          <p:cNvPr id="10" name="TextBox 9">
+            <a:extLst>
+              <a:ext uri="{FF2B5EF4-FFF2-40B4-BE49-F238E27FC236}">
+                <a16:creationId xmlns:a16="http://schemas.microsoft.com/office/drawing/2014/main" id="{FAEAA116-D678-69FB-B301-804DDDE76616}"/>
+              </a:ext>
+            </a:extLst>
+          </p:cNvPr>
+          <p:cNvSpPr txBox="1"/>
+          <p:nvPr userDrawn="1"/>
+        </p:nvSpPr>
+        <p:spPr>
+          <a:xfrm>
+            <a:off x="6096000" y="6078717"/>
+            <a:ext cx="3725848" cy="461665"/>
+          </a:xfrm>
+          <a:prstGeom prst="rect">
+            <a:avLst/>
+          </a:prstGeom>
+          <a:noFill/>
+        </p:spPr>
+        <p:txBody>
+          <a:bodyPr wrap="square" rtlCol="0">
+            <a:spAutoFit/>
+          </a:bodyPr>
+          <a:lstStyle/>
+          <a:p>
+            <a:r>
+              <a:rPr lang="en-GB" sz="2400" dirty="0">
+                <a:hlinkClick r:id="rId3"/>
+              </a:rPr>
+              <a:t>https://zombono.com/</a:t>
+            </a:r>
+            <a:r>
+              <a:rPr lang="en-GB" sz="2400" dirty="0"/>
+              <a:t> </a:t>
+            </a:r>
           </a:p>
         </p:txBody>
       </p:sp>
@@ -2530,7 +2939,12 @@
             <p:ph type="title"/>
           </p:nvPr>
         </p:nvSpPr>
-        <p:spPr/>
+        <p:spPr>
+          <a:xfrm>
+            <a:off x="677334" y="234389"/>
+            <a:ext cx="8596668" cy="1320800"/>
+          </a:xfrm>
+        </p:spPr>
         <p:txBody>
           <a:bodyPr/>
           <a:lstStyle/>
@@ -2553,7 +2967,12 @@
             <p:ph type="body" orient="vert" idx="1"/>
           </p:nvPr>
         </p:nvSpPr>
-        <p:spPr/>
+        <p:spPr>
+          <a:xfrm>
+            <a:off x="677334" y="1785378"/>
+            <a:ext cx="8596668" cy="3880773"/>
+          </a:xfrm>
+        </p:spPr>
         <p:txBody>
           <a:bodyPr vert="eaVert"/>
           <a:lstStyle/>
@@ -2612,7 +3031,7 @@
           <a:p>
             <a:fld id="{C42A3D91-6356-4AF1-BC75-05775A6D11B7}" type="datetimeFigureOut">
               <a:rPr lang="en-GB" smtClean="0"/>
-              <a:t>22/03/2024</a:t>
+              <a:t>27/03/2024</a:t>
             </a:fld>
             <a:endParaRPr lang="en-GB"/>
           </a:p>
@@ -2657,6 +3076,83 @@
               <a:t>‹#›</a:t>
             </a:fld>
             <a:endParaRPr lang="en-GB"/>
+          </a:p>
+        </p:txBody>
+      </p:sp>
+      <p:pic>
+        <p:nvPicPr>
+          <p:cNvPr id="9" name="Picture 8">
+            <a:extLst>
+              <a:ext uri="{FF2B5EF4-FFF2-40B4-BE49-F238E27FC236}">
+                <a16:creationId xmlns:a16="http://schemas.microsoft.com/office/drawing/2014/main" id="{292116B7-E6E5-F05E-3E94-563B95E1D030}"/>
+              </a:ext>
+            </a:extLst>
+          </p:cNvPr>
+          <p:cNvPicPr>
+            <a:picLocks noChangeAspect="1"/>
+          </p:cNvPicPr>
+          <p:nvPr userDrawn="1"/>
+        </p:nvPicPr>
+        <p:blipFill>
+          <a:blip r:embed="rId2">
+            <a:extLst>
+              <a:ext uri="{28A0092B-C50C-407E-A947-70E740481C1C}">
+                <a14:useLocalDpi xmlns:a14="http://schemas.microsoft.com/office/drawing/2010/main" val="0"/>
+              </a:ext>
+            </a:extLst>
+          </a:blip>
+          <a:stretch>
+            <a:fillRect/>
+          </a:stretch>
+        </p:blipFill>
+        <p:spPr>
+          <a:xfrm>
+            <a:off x="677334" y="5761100"/>
+            <a:ext cx="3289055" cy="1096900"/>
+          </a:xfrm>
+          <a:prstGeom prst="rect">
+            <a:avLst/>
+          </a:prstGeom>
+        </p:spPr>
+      </p:pic>
+      <p:sp>
+        <p:nvSpPr>
+          <p:cNvPr id="10" name="TextBox 9">
+            <a:extLst>
+              <a:ext uri="{FF2B5EF4-FFF2-40B4-BE49-F238E27FC236}">
+                <a16:creationId xmlns:a16="http://schemas.microsoft.com/office/drawing/2014/main" id="{425BC4DF-2BDC-B5FD-2C80-A294E265D0DC}"/>
+              </a:ext>
+            </a:extLst>
+          </p:cNvPr>
+          <p:cNvSpPr txBox="1"/>
+          <p:nvPr userDrawn="1"/>
+        </p:nvSpPr>
+        <p:spPr>
+          <a:xfrm>
+            <a:off x="6096000" y="6078717"/>
+            <a:ext cx="3725848" cy="461665"/>
+          </a:xfrm>
+          <a:prstGeom prst="rect">
+            <a:avLst/>
+          </a:prstGeom>
+          <a:noFill/>
+        </p:spPr>
+        <p:txBody>
+          <a:bodyPr wrap="square" rtlCol="0">
+            <a:spAutoFit/>
+          </a:bodyPr>
+          <a:lstStyle/>
+          <a:p>
+            <a:r>
+              <a:rPr lang="en-GB" sz="2400" dirty="0">
+                <a:hlinkClick r:id="rId3"/>
+              </a:rPr>
+              <a:t>https://zombono.com/</a:t>
+            </a:r>
+            <a:r>
+              <a:rPr lang="en-GB" sz="2400" dirty="0"/>
+              <a:t> </a:t>
+            </a:r>
           </a:p>
         </p:txBody>
       </p:sp>
@@ -2702,7 +3198,7 @@
         </p:nvSpPr>
         <p:spPr>
           <a:xfrm>
-            <a:off x="7967673" y="609599"/>
+            <a:off x="7969259" y="412565"/>
             <a:ext cx="1304743" cy="5251451"/>
           </a:xfrm>
         </p:spPr>
@@ -2730,7 +3226,7 @@
         </p:nvSpPr>
         <p:spPr>
           <a:xfrm>
-            <a:off x="677335" y="609600"/>
+            <a:off x="678921" y="412566"/>
             <a:ext cx="7060150" cy="5251450"/>
           </a:xfrm>
         </p:spPr>
@@ -2792,7 +3288,7 @@
           <a:p>
             <a:fld id="{C42A3D91-6356-4AF1-BC75-05775A6D11B7}" type="datetimeFigureOut">
               <a:rPr lang="en-GB" smtClean="0"/>
-              <a:t>22/03/2024</a:t>
+              <a:t>27/03/2024</a:t>
             </a:fld>
             <a:endParaRPr lang="en-GB"/>
           </a:p>
@@ -2837,6 +3333,83 @@
               <a:t>‹#›</a:t>
             </a:fld>
             <a:endParaRPr lang="en-GB"/>
+          </a:p>
+        </p:txBody>
+      </p:sp>
+      <p:pic>
+        <p:nvPicPr>
+          <p:cNvPr id="9" name="Picture 8">
+            <a:extLst>
+              <a:ext uri="{FF2B5EF4-FFF2-40B4-BE49-F238E27FC236}">
+                <a16:creationId xmlns:a16="http://schemas.microsoft.com/office/drawing/2014/main" id="{25C4FCDA-2BFF-3B0D-AADE-0D4C81F8ABE5}"/>
+              </a:ext>
+            </a:extLst>
+          </p:cNvPr>
+          <p:cNvPicPr>
+            <a:picLocks noChangeAspect="1"/>
+          </p:cNvPicPr>
+          <p:nvPr userDrawn="1"/>
+        </p:nvPicPr>
+        <p:blipFill>
+          <a:blip r:embed="rId2">
+            <a:extLst>
+              <a:ext uri="{28A0092B-C50C-407E-A947-70E740481C1C}">
+                <a14:useLocalDpi xmlns:a14="http://schemas.microsoft.com/office/drawing/2010/main" val="0"/>
+              </a:ext>
+            </a:extLst>
+          </a:blip>
+          <a:stretch>
+            <a:fillRect/>
+          </a:stretch>
+        </p:blipFill>
+        <p:spPr>
+          <a:xfrm>
+            <a:off x="677334" y="5761100"/>
+            <a:ext cx="3289055" cy="1096900"/>
+          </a:xfrm>
+          <a:prstGeom prst="rect">
+            <a:avLst/>
+          </a:prstGeom>
+        </p:spPr>
+      </p:pic>
+      <p:sp>
+        <p:nvSpPr>
+          <p:cNvPr id="10" name="TextBox 9">
+            <a:extLst>
+              <a:ext uri="{FF2B5EF4-FFF2-40B4-BE49-F238E27FC236}">
+                <a16:creationId xmlns:a16="http://schemas.microsoft.com/office/drawing/2014/main" id="{20594953-C597-A54B-1F68-6807F16E8C46}"/>
+              </a:ext>
+            </a:extLst>
+          </p:cNvPr>
+          <p:cNvSpPr txBox="1"/>
+          <p:nvPr userDrawn="1"/>
+        </p:nvSpPr>
+        <p:spPr>
+          <a:xfrm>
+            <a:off x="6096000" y="6078717"/>
+            <a:ext cx="3725848" cy="461665"/>
+          </a:xfrm>
+          <a:prstGeom prst="rect">
+            <a:avLst/>
+          </a:prstGeom>
+          <a:noFill/>
+        </p:spPr>
+        <p:txBody>
+          <a:bodyPr wrap="square" rtlCol="0">
+            <a:spAutoFit/>
+          </a:bodyPr>
+          <a:lstStyle/>
+          <a:p>
+            <a:r>
+              <a:rPr lang="en-GB" sz="2400" dirty="0">
+                <a:hlinkClick r:id="rId3"/>
+              </a:rPr>
+              <a:t>https://zombono.com/</a:t>
+            </a:r>
+            <a:r>
+              <a:rPr lang="en-GB" sz="2400" dirty="0"/>
+              <a:t> </a:t>
+            </a:r>
           </a:p>
         </p:txBody>
       </p:sp>
@@ -2880,7 +3453,12 @@
             <p:ph type="title"/>
           </p:nvPr>
         </p:nvSpPr>
-        <p:spPr/>
+        <p:spPr>
+          <a:xfrm>
+            <a:off x="677334" y="286228"/>
+            <a:ext cx="8596668" cy="1320800"/>
+          </a:xfrm>
+        </p:spPr>
         <p:txBody>
           <a:bodyPr>
             <a:normAutofit/>
@@ -2909,7 +3487,12 @@
             <p:ph idx="1"/>
           </p:nvPr>
         </p:nvSpPr>
-        <p:spPr/>
+        <p:spPr>
+          <a:xfrm>
+            <a:off x="677334" y="1837217"/>
+            <a:ext cx="8596668" cy="3880773"/>
+          </a:xfrm>
+        </p:spPr>
         <p:txBody>
           <a:bodyPr/>
           <a:lstStyle/>
@@ -2968,7 +3551,7 @@
           <a:p>
             <a:fld id="{C42A3D91-6356-4AF1-BC75-05775A6D11B7}" type="datetimeFigureOut">
               <a:rPr lang="en-GB" smtClean="0"/>
-              <a:t>22/03/2024</a:t>
+              <a:t>27/03/2024</a:t>
             </a:fld>
             <a:endParaRPr lang="en-GB"/>
           </a:p>
@@ -3013,6 +3596,83 @@
               <a:t>‹#›</a:t>
             </a:fld>
             <a:endParaRPr lang="en-GB"/>
+          </a:p>
+        </p:txBody>
+      </p:sp>
+      <p:pic>
+        <p:nvPicPr>
+          <p:cNvPr id="9" name="Picture 8">
+            <a:extLst>
+              <a:ext uri="{FF2B5EF4-FFF2-40B4-BE49-F238E27FC236}">
+                <a16:creationId xmlns:a16="http://schemas.microsoft.com/office/drawing/2014/main" id="{FFD42F95-1898-65F4-F518-AB5EBF07B04E}"/>
+              </a:ext>
+            </a:extLst>
+          </p:cNvPr>
+          <p:cNvPicPr>
+            <a:picLocks noChangeAspect="1"/>
+          </p:cNvPicPr>
+          <p:nvPr userDrawn="1"/>
+        </p:nvPicPr>
+        <p:blipFill>
+          <a:blip r:embed="rId2">
+            <a:extLst>
+              <a:ext uri="{28A0092B-C50C-407E-A947-70E740481C1C}">
+                <a14:useLocalDpi xmlns:a14="http://schemas.microsoft.com/office/drawing/2010/main" val="0"/>
+              </a:ext>
+            </a:extLst>
+          </a:blip>
+          <a:stretch>
+            <a:fillRect/>
+          </a:stretch>
+        </p:blipFill>
+        <p:spPr>
+          <a:xfrm>
+            <a:off x="677334" y="5761100"/>
+            <a:ext cx="3289055" cy="1096900"/>
+          </a:xfrm>
+          <a:prstGeom prst="rect">
+            <a:avLst/>
+          </a:prstGeom>
+        </p:spPr>
+      </p:pic>
+      <p:sp>
+        <p:nvSpPr>
+          <p:cNvPr id="10" name="TextBox 9">
+            <a:extLst>
+              <a:ext uri="{FF2B5EF4-FFF2-40B4-BE49-F238E27FC236}">
+                <a16:creationId xmlns:a16="http://schemas.microsoft.com/office/drawing/2014/main" id="{0F02BC52-BEE6-5227-3C68-C41E11257DDB}"/>
+              </a:ext>
+            </a:extLst>
+          </p:cNvPr>
+          <p:cNvSpPr txBox="1"/>
+          <p:nvPr userDrawn="1"/>
+        </p:nvSpPr>
+        <p:spPr>
+          <a:xfrm>
+            <a:off x="6096000" y="6078717"/>
+            <a:ext cx="3725848" cy="461665"/>
+          </a:xfrm>
+          <a:prstGeom prst="rect">
+            <a:avLst/>
+          </a:prstGeom>
+          <a:noFill/>
+        </p:spPr>
+        <p:txBody>
+          <a:bodyPr wrap="square" rtlCol="0">
+            <a:spAutoFit/>
+          </a:bodyPr>
+          <a:lstStyle/>
+          <a:p>
+            <a:r>
+              <a:rPr lang="en-GB" sz="2400" dirty="0">
+                <a:hlinkClick r:id="rId3"/>
+              </a:rPr>
+              <a:t>https://zombono.com/</a:t>
+            </a:r>
+            <a:r>
+              <a:rPr lang="en-GB" sz="2400" dirty="0"/>
+              <a:t> </a:t>
+            </a:r>
           </a:p>
         </p:txBody>
       </p:sp>
@@ -3058,7 +3718,7 @@
         </p:nvSpPr>
         <p:spPr>
           <a:xfrm>
-            <a:off x="677335" y="2700867"/>
+            <a:off x="677334" y="1677410"/>
             <a:ext cx="8596668" cy="1826581"/>
           </a:xfrm>
         </p:spPr>
@@ -3090,7 +3750,7 @@
         </p:nvSpPr>
         <p:spPr>
           <a:xfrm>
-            <a:off x="677335" y="4527448"/>
+            <a:off x="677334" y="3503991"/>
             <a:ext cx="8596668" cy="860400"/>
           </a:xfrm>
         </p:spPr>
@@ -3215,7 +3875,7 @@
           <a:p>
             <a:fld id="{C42A3D91-6356-4AF1-BC75-05775A6D11B7}" type="datetimeFigureOut">
               <a:rPr lang="en-GB" smtClean="0"/>
-              <a:t>22/03/2024</a:t>
+              <a:t>27/03/2024</a:t>
             </a:fld>
             <a:endParaRPr lang="en-GB"/>
           </a:p>
@@ -3260,6 +3920,83 @@
               <a:t>‹#›</a:t>
             </a:fld>
             <a:endParaRPr lang="en-GB"/>
+          </a:p>
+        </p:txBody>
+      </p:sp>
+      <p:pic>
+        <p:nvPicPr>
+          <p:cNvPr id="9" name="Picture 8">
+            <a:extLst>
+              <a:ext uri="{FF2B5EF4-FFF2-40B4-BE49-F238E27FC236}">
+                <a16:creationId xmlns:a16="http://schemas.microsoft.com/office/drawing/2014/main" id="{15316B95-779A-7B0C-10E2-40697F375982}"/>
+              </a:ext>
+            </a:extLst>
+          </p:cNvPr>
+          <p:cNvPicPr>
+            <a:picLocks noChangeAspect="1"/>
+          </p:cNvPicPr>
+          <p:nvPr userDrawn="1"/>
+        </p:nvPicPr>
+        <p:blipFill>
+          <a:blip r:embed="rId2">
+            <a:extLst>
+              <a:ext uri="{28A0092B-C50C-407E-A947-70E740481C1C}">
+                <a14:useLocalDpi xmlns:a14="http://schemas.microsoft.com/office/drawing/2010/main" val="0"/>
+              </a:ext>
+            </a:extLst>
+          </a:blip>
+          <a:stretch>
+            <a:fillRect/>
+          </a:stretch>
+        </p:blipFill>
+        <p:spPr>
+          <a:xfrm>
+            <a:off x="677334" y="5761100"/>
+            <a:ext cx="3289055" cy="1096900"/>
+          </a:xfrm>
+          <a:prstGeom prst="rect">
+            <a:avLst/>
+          </a:prstGeom>
+        </p:spPr>
+      </p:pic>
+      <p:sp>
+        <p:nvSpPr>
+          <p:cNvPr id="10" name="TextBox 9">
+            <a:extLst>
+              <a:ext uri="{FF2B5EF4-FFF2-40B4-BE49-F238E27FC236}">
+                <a16:creationId xmlns:a16="http://schemas.microsoft.com/office/drawing/2014/main" id="{88A4DE91-BBEA-D17C-A316-A7054FD47171}"/>
+              </a:ext>
+            </a:extLst>
+          </p:cNvPr>
+          <p:cNvSpPr txBox="1"/>
+          <p:nvPr userDrawn="1"/>
+        </p:nvSpPr>
+        <p:spPr>
+          <a:xfrm>
+            <a:off x="6096000" y="6078717"/>
+            <a:ext cx="3725848" cy="461665"/>
+          </a:xfrm>
+          <a:prstGeom prst="rect">
+            <a:avLst/>
+          </a:prstGeom>
+          <a:noFill/>
+        </p:spPr>
+        <p:txBody>
+          <a:bodyPr wrap="square" rtlCol="0">
+            <a:spAutoFit/>
+          </a:bodyPr>
+          <a:lstStyle/>
+          <a:p>
+            <a:r>
+              <a:rPr lang="en-GB" sz="2400" dirty="0">
+                <a:hlinkClick r:id="rId3"/>
+              </a:rPr>
+              <a:t>https://zombono.com/</a:t>
+            </a:r>
+            <a:r>
+              <a:rPr lang="en-GB" sz="2400" dirty="0"/>
+              <a:t> </a:t>
+            </a:r>
           </a:p>
         </p:txBody>
       </p:sp>
@@ -3303,16 +4040,20 @@
             <p:ph type="title"/>
           </p:nvPr>
         </p:nvSpPr>
-        <p:spPr/>
+        <p:spPr>
+          <a:xfrm>
+            <a:off x="677332" y="341153"/>
+            <a:ext cx="8596668" cy="1320800"/>
+          </a:xfrm>
+        </p:spPr>
         <p:txBody>
           <a:bodyPr/>
           <a:lstStyle/>
           <a:p>
             <a:r>
-              <a:rPr lang="en-US"/>
+              <a:rPr lang="en-US" dirty="0"/>
               <a:t>Click to edit Master title style</a:t>
             </a:r>
-            <a:endParaRPr lang="en-US" dirty="0"/>
           </a:p>
         </p:txBody>
       </p:sp>
@@ -3328,7 +4069,7 @@
         </p:nvSpPr>
         <p:spPr>
           <a:xfrm>
-            <a:off x="677334" y="2160589"/>
+            <a:off x="677332" y="1892142"/>
             <a:ext cx="4184035" cy="3880772"/>
           </a:xfrm>
         </p:spPr>
@@ -3338,38 +4079,37 @@
           <a:p>
             <a:pPr lvl="0"/>
             <a:r>
-              <a:rPr lang="en-US"/>
+              <a:rPr lang="en-US" dirty="0"/>
               <a:t>Click to edit Master text styles</a:t>
             </a:r>
           </a:p>
           <a:p>
             <a:pPr lvl="1"/>
             <a:r>
-              <a:rPr lang="en-US"/>
+              <a:rPr lang="en-US" dirty="0"/>
               <a:t>Second level</a:t>
             </a:r>
           </a:p>
           <a:p>
             <a:pPr lvl="2"/>
             <a:r>
-              <a:rPr lang="en-US"/>
+              <a:rPr lang="en-US" dirty="0"/>
               <a:t>Third level</a:t>
             </a:r>
           </a:p>
           <a:p>
             <a:pPr lvl="3"/>
             <a:r>
-              <a:rPr lang="en-US"/>
+              <a:rPr lang="en-US" dirty="0"/>
               <a:t>Fourth level</a:t>
             </a:r>
           </a:p>
           <a:p>
             <a:pPr lvl="4"/>
             <a:r>
-              <a:rPr lang="en-US"/>
+              <a:rPr lang="en-US" dirty="0"/>
               <a:t>Fifth level</a:t>
             </a:r>
-            <a:endParaRPr lang="en-US" dirty="0"/>
           </a:p>
         </p:txBody>
       </p:sp>
@@ -3385,7 +4125,7 @@
         </p:nvSpPr>
         <p:spPr>
           <a:xfrm>
-            <a:off x="5089970" y="2160589"/>
+            <a:off x="5089968" y="1892142"/>
             <a:ext cx="4184034" cy="3880773"/>
           </a:xfrm>
         </p:spPr>
@@ -3395,38 +4135,37 @@
           <a:p>
             <a:pPr lvl="0"/>
             <a:r>
-              <a:rPr lang="en-US"/>
+              <a:rPr lang="en-US" dirty="0"/>
               <a:t>Click to edit Master text styles</a:t>
             </a:r>
           </a:p>
           <a:p>
             <a:pPr lvl="1"/>
             <a:r>
-              <a:rPr lang="en-US"/>
+              <a:rPr lang="en-US" dirty="0"/>
               <a:t>Second level</a:t>
             </a:r>
           </a:p>
           <a:p>
             <a:pPr lvl="2"/>
             <a:r>
-              <a:rPr lang="en-US"/>
+              <a:rPr lang="en-US" dirty="0"/>
               <a:t>Third level</a:t>
             </a:r>
           </a:p>
           <a:p>
             <a:pPr lvl="3"/>
             <a:r>
-              <a:rPr lang="en-US"/>
+              <a:rPr lang="en-US" dirty="0"/>
               <a:t>Fourth level</a:t>
             </a:r>
           </a:p>
           <a:p>
             <a:pPr lvl="4"/>
             <a:r>
-              <a:rPr lang="en-US"/>
+              <a:rPr lang="en-US" dirty="0"/>
               <a:t>Fifth level</a:t>
             </a:r>
-            <a:endParaRPr lang="en-US" dirty="0"/>
           </a:p>
         </p:txBody>
       </p:sp>
@@ -3447,7 +4186,7 @@
           <a:p>
             <a:fld id="{C42A3D91-6356-4AF1-BC75-05775A6D11B7}" type="datetimeFigureOut">
               <a:rPr lang="en-GB" smtClean="0"/>
-              <a:t>22/03/2024</a:t>
+              <a:t>27/03/2024</a:t>
             </a:fld>
             <a:endParaRPr lang="en-GB"/>
           </a:p>
@@ -3492,6 +4231,83 @@
               <a:t>‹#›</a:t>
             </a:fld>
             <a:endParaRPr lang="en-GB"/>
+          </a:p>
+        </p:txBody>
+      </p:sp>
+      <p:pic>
+        <p:nvPicPr>
+          <p:cNvPr id="10" name="Picture 9">
+            <a:extLst>
+              <a:ext uri="{FF2B5EF4-FFF2-40B4-BE49-F238E27FC236}">
+                <a16:creationId xmlns:a16="http://schemas.microsoft.com/office/drawing/2014/main" id="{68147C53-324E-81AB-7954-065CF8B43CD1}"/>
+              </a:ext>
+            </a:extLst>
+          </p:cNvPr>
+          <p:cNvPicPr>
+            <a:picLocks noChangeAspect="1"/>
+          </p:cNvPicPr>
+          <p:nvPr userDrawn="1"/>
+        </p:nvPicPr>
+        <p:blipFill>
+          <a:blip r:embed="rId2">
+            <a:extLst>
+              <a:ext uri="{28A0092B-C50C-407E-A947-70E740481C1C}">
+                <a14:useLocalDpi xmlns:a14="http://schemas.microsoft.com/office/drawing/2010/main" val="0"/>
+              </a:ext>
+            </a:extLst>
+          </a:blip>
+          <a:stretch>
+            <a:fillRect/>
+          </a:stretch>
+        </p:blipFill>
+        <p:spPr>
+          <a:xfrm>
+            <a:off x="677334" y="5761100"/>
+            <a:ext cx="3289055" cy="1096900"/>
+          </a:xfrm>
+          <a:prstGeom prst="rect">
+            <a:avLst/>
+          </a:prstGeom>
+        </p:spPr>
+      </p:pic>
+      <p:sp>
+        <p:nvSpPr>
+          <p:cNvPr id="11" name="TextBox 10">
+            <a:extLst>
+              <a:ext uri="{FF2B5EF4-FFF2-40B4-BE49-F238E27FC236}">
+                <a16:creationId xmlns:a16="http://schemas.microsoft.com/office/drawing/2014/main" id="{E0991A3C-B5D4-B070-0627-0D5B274317AF}"/>
+              </a:ext>
+            </a:extLst>
+          </p:cNvPr>
+          <p:cNvSpPr txBox="1"/>
+          <p:nvPr userDrawn="1"/>
+        </p:nvSpPr>
+        <p:spPr>
+          <a:xfrm>
+            <a:off x="6096000" y="6078717"/>
+            <a:ext cx="3725848" cy="461665"/>
+          </a:xfrm>
+          <a:prstGeom prst="rect">
+            <a:avLst/>
+          </a:prstGeom>
+          <a:noFill/>
+        </p:spPr>
+        <p:txBody>
+          <a:bodyPr wrap="square" rtlCol="0">
+            <a:spAutoFit/>
+          </a:bodyPr>
+          <a:lstStyle/>
+          <a:p>
+            <a:r>
+              <a:rPr lang="en-GB" sz="2400" dirty="0">
+                <a:hlinkClick r:id="rId3"/>
+              </a:rPr>
+              <a:t>https://zombono.com/</a:t>
+            </a:r>
+            <a:r>
+              <a:rPr lang="en-GB" sz="2400" dirty="0"/>
+              <a:t> </a:t>
+            </a:r>
           </a:p>
         </p:txBody>
       </p:sp>
@@ -3535,7 +4351,12 @@
             <p:ph type="title"/>
           </p:nvPr>
         </p:nvSpPr>
-        <p:spPr/>
+        <p:spPr>
+          <a:xfrm>
+            <a:off x="677335" y="253036"/>
+            <a:ext cx="8596668" cy="1320800"/>
+          </a:xfrm>
+        </p:spPr>
         <p:txBody>
           <a:bodyPr/>
           <a:lstStyle>
@@ -3545,10 +4366,9 @@
           </a:lstStyle>
           <a:p>
             <a:r>
-              <a:rPr lang="en-US"/>
+              <a:rPr lang="en-US" dirty="0"/>
               <a:t>Click to edit Master title style</a:t>
             </a:r>
-            <a:endParaRPr lang="en-US" dirty="0"/>
           </a:p>
         </p:txBody>
       </p:sp>
@@ -3564,7 +4384,7 @@
         </p:nvSpPr>
         <p:spPr>
           <a:xfrm>
-            <a:off x="675745" y="2160983"/>
+            <a:off x="675746" y="1804419"/>
             <a:ext cx="4185623" cy="576262"/>
           </a:xfrm>
         </p:spPr>
@@ -3613,7 +4433,7 @@
           <a:p>
             <a:pPr lvl="0"/>
             <a:r>
-              <a:rPr lang="en-US"/>
+              <a:rPr lang="en-US" dirty="0"/>
               <a:t>Click to edit Master text styles</a:t>
             </a:r>
           </a:p>
@@ -3631,7 +4451,7 @@
         </p:nvSpPr>
         <p:spPr>
           <a:xfrm>
-            <a:off x="675745" y="2737245"/>
+            <a:off x="675746" y="2380681"/>
             <a:ext cx="4185623" cy="3304117"/>
           </a:xfrm>
         </p:spPr>
@@ -3643,38 +4463,37 @@
           <a:p>
             <a:pPr lvl="0"/>
             <a:r>
-              <a:rPr lang="en-US"/>
+              <a:rPr lang="en-US" dirty="0"/>
               <a:t>Click to edit Master text styles</a:t>
             </a:r>
           </a:p>
           <a:p>
             <a:pPr lvl="1"/>
             <a:r>
-              <a:rPr lang="en-US"/>
+              <a:rPr lang="en-US" dirty="0"/>
               <a:t>Second level</a:t>
             </a:r>
           </a:p>
           <a:p>
             <a:pPr lvl="2"/>
             <a:r>
-              <a:rPr lang="en-US"/>
+              <a:rPr lang="en-US" dirty="0"/>
               <a:t>Third level</a:t>
             </a:r>
           </a:p>
           <a:p>
             <a:pPr lvl="3"/>
             <a:r>
-              <a:rPr lang="en-US"/>
+              <a:rPr lang="en-US" dirty="0"/>
               <a:t>Fourth level</a:t>
             </a:r>
           </a:p>
           <a:p>
             <a:pPr lvl="4"/>
             <a:r>
-              <a:rPr lang="en-US"/>
+              <a:rPr lang="en-US" dirty="0"/>
               <a:t>Fifth level</a:t>
             </a:r>
-            <a:endParaRPr lang="en-US" dirty="0"/>
           </a:p>
         </p:txBody>
       </p:sp>
@@ -3690,7 +4509,7 @@
         </p:nvSpPr>
         <p:spPr>
           <a:xfrm>
-            <a:off x="5088383" y="2160983"/>
+            <a:off x="5088384" y="1804419"/>
             <a:ext cx="4185618" cy="576262"/>
           </a:xfrm>
         </p:spPr>
@@ -3739,7 +4558,7 @@
           <a:p>
             <a:pPr lvl="0"/>
             <a:r>
-              <a:rPr lang="en-US"/>
+              <a:rPr lang="en-US" dirty="0"/>
               <a:t>Click to edit Master text styles</a:t>
             </a:r>
           </a:p>
@@ -3757,7 +4576,7 @@
         </p:nvSpPr>
         <p:spPr>
           <a:xfrm>
-            <a:off x="5088384" y="2737245"/>
+            <a:off x="5088385" y="2380681"/>
             <a:ext cx="4185617" cy="3304117"/>
           </a:xfrm>
         </p:spPr>
@@ -3821,7 +4640,7 @@
           <a:p>
             <a:fld id="{C42A3D91-6356-4AF1-BC75-05775A6D11B7}" type="datetimeFigureOut">
               <a:rPr lang="en-GB" smtClean="0"/>
-              <a:t>22/03/2024</a:t>
+              <a:t>27/03/2024</a:t>
             </a:fld>
             <a:endParaRPr lang="en-GB"/>
           </a:p>
@@ -3866,6 +4685,83 @@
               <a:t>‹#›</a:t>
             </a:fld>
             <a:endParaRPr lang="en-GB"/>
+          </a:p>
+        </p:txBody>
+      </p:sp>
+      <p:pic>
+        <p:nvPicPr>
+          <p:cNvPr id="12" name="Picture 11">
+            <a:extLst>
+              <a:ext uri="{FF2B5EF4-FFF2-40B4-BE49-F238E27FC236}">
+                <a16:creationId xmlns:a16="http://schemas.microsoft.com/office/drawing/2014/main" id="{A92DED7A-EB8D-F7E7-763C-7F9C90BB2F55}"/>
+              </a:ext>
+            </a:extLst>
+          </p:cNvPr>
+          <p:cNvPicPr>
+            <a:picLocks noChangeAspect="1"/>
+          </p:cNvPicPr>
+          <p:nvPr userDrawn="1"/>
+        </p:nvPicPr>
+        <p:blipFill>
+          <a:blip r:embed="rId2">
+            <a:extLst>
+              <a:ext uri="{28A0092B-C50C-407E-A947-70E740481C1C}">
+                <a14:useLocalDpi xmlns:a14="http://schemas.microsoft.com/office/drawing/2010/main" val="0"/>
+              </a:ext>
+            </a:extLst>
+          </a:blip>
+          <a:stretch>
+            <a:fillRect/>
+          </a:stretch>
+        </p:blipFill>
+        <p:spPr>
+          <a:xfrm>
+            <a:off x="677334" y="5761100"/>
+            <a:ext cx="3289055" cy="1096900"/>
+          </a:xfrm>
+          <a:prstGeom prst="rect">
+            <a:avLst/>
+          </a:prstGeom>
+        </p:spPr>
+      </p:pic>
+      <p:sp>
+        <p:nvSpPr>
+          <p:cNvPr id="13" name="TextBox 12">
+            <a:extLst>
+              <a:ext uri="{FF2B5EF4-FFF2-40B4-BE49-F238E27FC236}">
+                <a16:creationId xmlns:a16="http://schemas.microsoft.com/office/drawing/2014/main" id="{FF01139C-B71A-8DAB-CCE2-0B3CF6152EE4}"/>
+              </a:ext>
+            </a:extLst>
+          </p:cNvPr>
+          <p:cNvSpPr txBox="1"/>
+          <p:nvPr userDrawn="1"/>
+        </p:nvSpPr>
+        <p:spPr>
+          <a:xfrm>
+            <a:off x="6096000" y="6078717"/>
+            <a:ext cx="3725848" cy="461665"/>
+          </a:xfrm>
+          <a:prstGeom prst="rect">
+            <a:avLst/>
+          </a:prstGeom>
+          <a:noFill/>
+        </p:spPr>
+        <p:txBody>
+          <a:bodyPr wrap="square" rtlCol="0">
+            <a:spAutoFit/>
+          </a:bodyPr>
+          <a:lstStyle/>
+          <a:p>
+            <a:r>
+              <a:rPr lang="en-GB" sz="2400" dirty="0">
+                <a:hlinkClick r:id="rId3"/>
+              </a:rPr>
+              <a:t>https://zombono.com/</a:t>
+            </a:r>
+            <a:r>
+              <a:rPr lang="en-GB" sz="2400" dirty="0"/>
+              <a:t> </a:t>
+            </a:r>
           </a:p>
         </p:txBody>
       </p:sp>
@@ -3911,7 +4807,7 @@
         </p:nvSpPr>
         <p:spPr>
           <a:xfrm>
-            <a:off x="677334" y="609600"/>
+            <a:off x="677334" y="412566"/>
             <a:ext cx="8596668" cy="1320800"/>
           </a:xfrm>
         </p:spPr>
@@ -3944,7 +4840,7 @@
           <a:p>
             <a:fld id="{C42A3D91-6356-4AF1-BC75-05775A6D11B7}" type="datetimeFigureOut">
               <a:rPr lang="en-GB" smtClean="0"/>
-              <a:t>22/03/2024</a:t>
+              <a:t>27/03/2024</a:t>
             </a:fld>
             <a:endParaRPr lang="en-GB"/>
           </a:p>
@@ -3989,6 +4885,83 @@
               <a:t>‹#›</a:t>
             </a:fld>
             <a:endParaRPr lang="en-GB"/>
+          </a:p>
+        </p:txBody>
+      </p:sp>
+      <p:pic>
+        <p:nvPicPr>
+          <p:cNvPr id="8" name="Picture 7">
+            <a:extLst>
+              <a:ext uri="{FF2B5EF4-FFF2-40B4-BE49-F238E27FC236}">
+                <a16:creationId xmlns:a16="http://schemas.microsoft.com/office/drawing/2014/main" id="{4264F8F0-474E-6665-2BAE-1A3109820E3F}"/>
+              </a:ext>
+            </a:extLst>
+          </p:cNvPr>
+          <p:cNvPicPr>
+            <a:picLocks noChangeAspect="1"/>
+          </p:cNvPicPr>
+          <p:nvPr userDrawn="1"/>
+        </p:nvPicPr>
+        <p:blipFill>
+          <a:blip r:embed="rId2">
+            <a:extLst>
+              <a:ext uri="{28A0092B-C50C-407E-A947-70E740481C1C}">
+                <a14:useLocalDpi xmlns:a14="http://schemas.microsoft.com/office/drawing/2010/main" val="0"/>
+              </a:ext>
+            </a:extLst>
+          </a:blip>
+          <a:stretch>
+            <a:fillRect/>
+          </a:stretch>
+        </p:blipFill>
+        <p:spPr>
+          <a:xfrm>
+            <a:off x="677334" y="5761100"/>
+            <a:ext cx="3289055" cy="1096900"/>
+          </a:xfrm>
+          <a:prstGeom prst="rect">
+            <a:avLst/>
+          </a:prstGeom>
+        </p:spPr>
+      </p:pic>
+      <p:sp>
+        <p:nvSpPr>
+          <p:cNvPr id="9" name="TextBox 8">
+            <a:extLst>
+              <a:ext uri="{FF2B5EF4-FFF2-40B4-BE49-F238E27FC236}">
+                <a16:creationId xmlns:a16="http://schemas.microsoft.com/office/drawing/2014/main" id="{463626BA-19C7-E304-2935-B5BAE7A209D1}"/>
+              </a:ext>
+            </a:extLst>
+          </p:cNvPr>
+          <p:cNvSpPr txBox="1"/>
+          <p:nvPr userDrawn="1"/>
+        </p:nvSpPr>
+        <p:spPr>
+          <a:xfrm>
+            <a:off x="6096000" y="6078717"/>
+            <a:ext cx="3725848" cy="461665"/>
+          </a:xfrm>
+          <a:prstGeom prst="rect">
+            <a:avLst/>
+          </a:prstGeom>
+          <a:noFill/>
+        </p:spPr>
+        <p:txBody>
+          <a:bodyPr wrap="square" rtlCol="0">
+            <a:spAutoFit/>
+          </a:bodyPr>
+          <a:lstStyle/>
+          <a:p>
+            <a:r>
+              <a:rPr lang="en-GB" sz="2400" dirty="0">
+                <a:hlinkClick r:id="rId3"/>
+              </a:rPr>
+              <a:t>https://zombono.com/</a:t>
+            </a:r>
+            <a:r>
+              <a:rPr lang="en-GB" sz="2400" dirty="0"/>
+              <a:t> </a:t>
+            </a:r>
           </a:p>
         </p:txBody>
       </p:sp>
@@ -4039,7 +5012,7 @@
           <a:p>
             <a:fld id="{C42A3D91-6356-4AF1-BC75-05775A6D11B7}" type="datetimeFigureOut">
               <a:rPr lang="en-GB" smtClean="0"/>
-              <a:t>22/03/2024</a:t>
+              <a:t>27/03/2024</a:t>
             </a:fld>
             <a:endParaRPr lang="en-GB"/>
           </a:p>
@@ -4084,6 +5057,83 @@
               <a:t>‹#›</a:t>
             </a:fld>
             <a:endParaRPr lang="en-GB"/>
+          </a:p>
+        </p:txBody>
+      </p:sp>
+      <p:pic>
+        <p:nvPicPr>
+          <p:cNvPr id="7" name="Picture 6">
+            <a:extLst>
+              <a:ext uri="{FF2B5EF4-FFF2-40B4-BE49-F238E27FC236}">
+                <a16:creationId xmlns:a16="http://schemas.microsoft.com/office/drawing/2014/main" id="{048A019C-D8F1-7EC9-EE89-F91095BFB3E0}"/>
+              </a:ext>
+            </a:extLst>
+          </p:cNvPr>
+          <p:cNvPicPr>
+            <a:picLocks noChangeAspect="1"/>
+          </p:cNvPicPr>
+          <p:nvPr userDrawn="1"/>
+        </p:nvPicPr>
+        <p:blipFill>
+          <a:blip r:embed="rId2">
+            <a:extLst>
+              <a:ext uri="{28A0092B-C50C-407E-A947-70E740481C1C}">
+                <a14:useLocalDpi xmlns:a14="http://schemas.microsoft.com/office/drawing/2010/main" val="0"/>
+              </a:ext>
+            </a:extLst>
+          </a:blip>
+          <a:stretch>
+            <a:fillRect/>
+          </a:stretch>
+        </p:blipFill>
+        <p:spPr>
+          <a:xfrm>
+            <a:off x="677334" y="5761100"/>
+            <a:ext cx="3289055" cy="1096900"/>
+          </a:xfrm>
+          <a:prstGeom prst="rect">
+            <a:avLst/>
+          </a:prstGeom>
+        </p:spPr>
+      </p:pic>
+      <p:sp>
+        <p:nvSpPr>
+          <p:cNvPr id="8" name="TextBox 7">
+            <a:extLst>
+              <a:ext uri="{FF2B5EF4-FFF2-40B4-BE49-F238E27FC236}">
+                <a16:creationId xmlns:a16="http://schemas.microsoft.com/office/drawing/2014/main" id="{96C6236C-D549-8175-EF1D-595E0B431D48}"/>
+              </a:ext>
+            </a:extLst>
+          </p:cNvPr>
+          <p:cNvSpPr txBox="1"/>
+          <p:nvPr userDrawn="1"/>
+        </p:nvSpPr>
+        <p:spPr>
+          <a:xfrm>
+            <a:off x="6096000" y="6078717"/>
+            <a:ext cx="3725848" cy="461665"/>
+          </a:xfrm>
+          <a:prstGeom prst="rect">
+            <a:avLst/>
+          </a:prstGeom>
+          <a:noFill/>
+        </p:spPr>
+        <p:txBody>
+          <a:bodyPr wrap="square" rtlCol="0">
+            <a:spAutoFit/>
+          </a:bodyPr>
+          <a:lstStyle/>
+          <a:p>
+            <a:r>
+              <a:rPr lang="en-GB" sz="2400" dirty="0">
+                <a:hlinkClick r:id="rId3"/>
+              </a:rPr>
+              <a:t>https://zombono.com/</a:t>
+            </a:r>
+            <a:r>
+              <a:rPr lang="en-GB" sz="2400" dirty="0"/>
+              <a:t> </a:t>
+            </a:r>
           </a:p>
         </p:txBody>
       </p:sp>
@@ -4129,7 +5179,7 @@
         </p:nvSpPr>
         <p:spPr>
           <a:xfrm>
-            <a:off x="677334" y="1498604"/>
+            <a:off x="677334" y="1253406"/>
             <a:ext cx="3854528" cy="1278466"/>
           </a:xfrm>
         </p:spPr>
@@ -4163,7 +5213,7 @@
         </p:nvSpPr>
         <p:spPr>
           <a:xfrm>
-            <a:off x="4760461" y="514924"/>
+            <a:off x="4760461" y="269726"/>
             <a:ext cx="4513541" cy="5526437"/>
           </a:xfrm>
         </p:spPr>
@@ -4222,7 +5272,7 @@
         </p:nvSpPr>
         <p:spPr>
           <a:xfrm>
-            <a:off x="677334" y="2777069"/>
+            <a:off x="677334" y="2531871"/>
             <a:ext cx="3854528" cy="2584449"/>
           </a:xfrm>
         </p:spPr>
@@ -4294,7 +5344,7 @@
           <a:p>
             <a:fld id="{C42A3D91-6356-4AF1-BC75-05775A6D11B7}" type="datetimeFigureOut">
               <a:rPr lang="en-GB" smtClean="0"/>
-              <a:t>22/03/2024</a:t>
+              <a:t>27/03/2024</a:t>
             </a:fld>
             <a:endParaRPr lang="en-GB"/>
           </a:p>
@@ -4339,6 +5389,83 @@
               <a:t>‹#›</a:t>
             </a:fld>
             <a:endParaRPr lang="en-GB"/>
+          </a:p>
+        </p:txBody>
+      </p:sp>
+      <p:pic>
+        <p:nvPicPr>
+          <p:cNvPr id="14" name="Picture 13">
+            <a:extLst>
+              <a:ext uri="{FF2B5EF4-FFF2-40B4-BE49-F238E27FC236}">
+                <a16:creationId xmlns:a16="http://schemas.microsoft.com/office/drawing/2014/main" id="{AE9402D4-7263-ED37-355B-9F33AF000B1A}"/>
+              </a:ext>
+            </a:extLst>
+          </p:cNvPr>
+          <p:cNvPicPr>
+            <a:picLocks noChangeAspect="1"/>
+          </p:cNvPicPr>
+          <p:nvPr userDrawn="1"/>
+        </p:nvPicPr>
+        <p:blipFill>
+          <a:blip r:embed="rId2">
+            <a:extLst>
+              <a:ext uri="{28A0092B-C50C-407E-A947-70E740481C1C}">
+                <a14:useLocalDpi xmlns:a14="http://schemas.microsoft.com/office/drawing/2010/main" val="0"/>
+              </a:ext>
+            </a:extLst>
+          </a:blip>
+          <a:stretch>
+            <a:fillRect/>
+          </a:stretch>
+        </p:blipFill>
+        <p:spPr>
+          <a:xfrm>
+            <a:off x="677334" y="5761100"/>
+            <a:ext cx="3289055" cy="1096900"/>
+          </a:xfrm>
+          <a:prstGeom prst="rect">
+            <a:avLst/>
+          </a:prstGeom>
+        </p:spPr>
+      </p:pic>
+      <p:sp>
+        <p:nvSpPr>
+          <p:cNvPr id="15" name="TextBox 14">
+            <a:extLst>
+              <a:ext uri="{FF2B5EF4-FFF2-40B4-BE49-F238E27FC236}">
+                <a16:creationId xmlns:a16="http://schemas.microsoft.com/office/drawing/2014/main" id="{94398C2A-12F9-2AE2-244A-62B40A462835}"/>
+              </a:ext>
+            </a:extLst>
+          </p:cNvPr>
+          <p:cNvSpPr txBox="1"/>
+          <p:nvPr userDrawn="1"/>
+        </p:nvSpPr>
+        <p:spPr>
+          <a:xfrm>
+            <a:off x="6096000" y="6078717"/>
+            <a:ext cx="3725848" cy="461665"/>
+          </a:xfrm>
+          <a:prstGeom prst="rect">
+            <a:avLst/>
+          </a:prstGeom>
+          <a:noFill/>
+        </p:spPr>
+        <p:txBody>
+          <a:bodyPr wrap="square" rtlCol="0">
+            <a:spAutoFit/>
+          </a:bodyPr>
+          <a:lstStyle/>
+          <a:p>
+            <a:r>
+              <a:rPr lang="en-GB" sz="2400" dirty="0">
+                <a:hlinkClick r:id="rId3"/>
+              </a:rPr>
+              <a:t>https://zombono.com/</a:t>
+            </a:r>
+            <a:r>
+              <a:rPr lang="en-GB" sz="2400" dirty="0"/>
+              <a:t> </a:t>
+            </a:r>
           </a:p>
         </p:txBody>
       </p:sp>
@@ -4384,7 +5511,7 @@
         </p:nvSpPr>
         <p:spPr>
           <a:xfrm>
-            <a:off x="677334" y="4800600"/>
+            <a:off x="688534" y="4435475"/>
             <a:ext cx="8596667" cy="566738"/>
           </a:xfrm>
         </p:spPr>
@@ -4418,7 +5545,7 @@
         </p:nvSpPr>
         <p:spPr>
           <a:xfrm>
-            <a:off x="677334" y="609600"/>
+            <a:off x="688534" y="244475"/>
             <a:ext cx="8596668" cy="3845718"/>
           </a:xfrm>
         </p:spPr>
@@ -4485,7 +5612,7 @@
         </p:nvSpPr>
         <p:spPr>
           <a:xfrm>
-            <a:off x="677334" y="5367338"/>
+            <a:off x="688534" y="5002213"/>
             <a:ext cx="8596667" cy="674024"/>
           </a:xfrm>
         </p:spPr>
@@ -4557,7 +5684,7 @@
           <a:p>
             <a:fld id="{C42A3D91-6356-4AF1-BC75-05775A6D11B7}" type="datetimeFigureOut">
               <a:rPr lang="en-GB" smtClean="0"/>
-              <a:t>22/03/2024</a:t>
+              <a:t>27/03/2024</a:t>
             </a:fld>
             <a:endParaRPr lang="en-GB"/>
           </a:p>
@@ -4573,12 +5700,17 @@
             <p:ph type="ftr" sz="quarter" idx="11"/>
           </p:nvPr>
         </p:nvSpPr>
-        <p:spPr/>
+        <p:spPr>
+          <a:xfrm>
+            <a:off x="670726" y="6041362"/>
+            <a:ext cx="6297612" cy="365125"/>
+          </a:xfrm>
+        </p:spPr>
         <p:txBody>
           <a:bodyPr/>
           <a:lstStyle/>
           <a:p>
-            <a:endParaRPr lang="en-GB"/>
+            <a:endParaRPr lang="en-GB" dirty="0"/>
           </a:p>
         </p:txBody>
       </p:sp>
@@ -4602,6 +5734,83 @@
               <a:t>‹#›</a:t>
             </a:fld>
             <a:endParaRPr lang="en-GB"/>
+          </a:p>
+        </p:txBody>
+      </p:sp>
+      <p:pic>
+        <p:nvPicPr>
+          <p:cNvPr id="14" name="Picture 13">
+            <a:extLst>
+              <a:ext uri="{FF2B5EF4-FFF2-40B4-BE49-F238E27FC236}">
+                <a16:creationId xmlns:a16="http://schemas.microsoft.com/office/drawing/2014/main" id="{19EF59F3-D8D5-B76E-D59E-887FF0DC5C1A}"/>
+              </a:ext>
+            </a:extLst>
+          </p:cNvPr>
+          <p:cNvPicPr>
+            <a:picLocks noChangeAspect="1"/>
+          </p:cNvPicPr>
+          <p:nvPr userDrawn="1"/>
+        </p:nvPicPr>
+        <p:blipFill>
+          <a:blip r:embed="rId2">
+            <a:extLst>
+              <a:ext uri="{28A0092B-C50C-407E-A947-70E740481C1C}">
+                <a14:useLocalDpi xmlns:a14="http://schemas.microsoft.com/office/drawing/2010/main" val="0"/>
+              </a:ext>
+            </a:extLst>
+          </a:blip>
+          <a:stretch>
+            <a:fillRect/>
+          </a:stretch>
+        </p:blipFill>
+        <p:spPr>
+          <a:xfrm>
+            <a:off x="677334" y="5761100"/>
+            <a:ext cx="3289055" cy="1096900"/>
+          </a:xfrm>
+          <a:prstGeom prst="rect">
+            <a:avLst/>
+          </a:prstGeom>
+        </p:spPr>
+      </p:pic>
+      <p:sp>
+        <p:nvSpPr>
+          <p:cNvPr id="15" name="TextBox 14">
+            <a:extLst>
+              <a:ext uri="{FF2B5EF4-FFF2-40B4-BE49-F238E27FC236}">
+                <a16:creationId xmlns:a16="http://schemas.microsoft.com/office/drawing/2014/main" id="{D92CAAC3-1A0D-E1BC-E27E-E9A698D478EA}"/>
+              </a:ext>
+            </a:extLst>
+          </p:cNvPr>
+          <p:cNvSpPr txBox="1"/>
+          <p:nvPr userDrawn="1"/>
+        </p:nvSpPr>
+        <p:spPr>
+          <a:xfrm>
+            <a:off x="6096000" y="6078717"/>
+            <a:ext cx="3725848" cy="461665"/>
+          </a:xfrm>
+          <a:prstGeom prst="rect">
+            <a:avLst/>
+          </a:prstGeom>
+          <a:noFill/>
+        </p:spPr>
+        <p:txBody>
+          <a:bodyPr wrap="square" rtlCol="0">
+            <a:spAutoFit/>
+          </a:bodyPr>
+          <a:lstStyle/>
+          <a:p>
+            <a:r>
+              <a:rPr lang="en-GB" sz="2400" dirty="0">
+                <a:hlinkClick r:id="rId3"/>
+              </a:rPr>
+              <a:t>https://zombono.com/</a:t>
+            </a:r>
+            <a:r>
+              <a:rPr lang="en-GB" sz="2400" dirty="0"/>
+              <a:t> </a:t>
+            </a:r>
           </a:p>
         </p:txBody>
       </p:sp>
@@ -5300,7 +6509,7 @@
           <a:p>
             <a:fld id="{C42A3D91-6356-4AF1-BC75-05775A6D11B7}" type="datetimeFigureOut">
               <a:rPr lang="en-GB" smtClean="0"/>
-              <a:t>22/03/2024</a:t>
+              <a:t>27/03/2024</a:t>
             </a:fld>
             <a:endParaRPr lang="en-GB"/>
           </a:p>
@@ -5842,7 +7051,7 @@
         </p:nvSpPr>
         <p:spPr>
           <a:xfrm>
-            <a:off x="691486" y="109180"/>
+            <a:off x="1239939" y="1756348"/>
             <a:ext cx="7933899" cy="2374713"/>
           </a:xfrm>
         </p:spPr>
@@ -5850,18 +7059,14 @@
           <a:bodyPr/>
           <a:lstStyle/>
           <a:p>
-            <a:pPr algn="l"/>
+            <a:pPr algn="ctr"/>
             <a:r>
               <a:rPr lang="en-GB" dirty="0" err="1"/>
               <a:t>Zombono</a:t>
             </a:r>
             <a:r>
-              <a:rPr lang="en-GB"/>
-              <a:t>: Replumbing </a:t>
-            </a:r>
-            <a:r>
               <a:rPr lang="en-GB" dirty="0"/>
-              <a:t>Old Technologies for Modern Experiences</a:t>
+              <a:t>: Replumbing Old Technologies for Modern Experiences</a:t>
             </a:r>
           </a:p>
         </p:txBody>
@@ -5884,7 +7089,7 @@
         </p:nvSpPr>
         <p:spPr>
           <a:xfrm>
-            <a:off x="469837" y="2332101"/>
+            <a:off x="1323420" y="4017868"/>
             <a:ext cx="7766936" cy="1096899"/>
           </a:xfrm>
         </p:spPr>
@@ -5892,23 +7097,10 @@
           <a:bodyPr/>
           <a:lstStyle/>
           <a:p>
-            <a:pPr marL="285750" indent="-285750" algn="l">
-              <a:buFont typeface="Arial" panose="020B0604020202020204" pitchFamily="34" charset="0"/>
-              <a:buChar char="•"/>
-            </a:pPr>
+            <a:pPr algn="ctr"/>
             <a:r>
               <a:rPr lang="en-GB" dirty="0"/>
-              <a:t>March 29, 2024</a:t>
-            </a:r>
-          </a:p>
-          <a:p>
-            <a:pPr marL="285750" indent="-285750" algn="l">
-              <a:buFont typeface="Arial" panose="020B0604020202020204" pitchFamily="34" charset="0"/>
-              <a:buChar char="•"/>
-            </a:pPr>
-            <a:r>
-              <a:rPr lang="en-GB" dirty="0"/>
-              <a:t>Connor Hyde</a:t>
+              <a:t>March 29, 2024, Connor Hyde</a:t>
             </a:r>
           </a:p>
         </p:txBody>
@@ -5926,10 +7118,1293 @@
 </p:sld>
 </file>
 
+<file path=ppt/slides/slide2.xml><?xml version="1.0" encoding="utf-8"?>
+<p:sld xmlns:a="http://schemas.openxmlformats.org/drawingml/2006/main" xmlns:r="http://schemas.openxmlformats.org/officeDocument/2006/relationships" xmlns:p="http://schemas.openxmlformats.org/presentationml/2006/main">
+  <p:cSld>
+    <p:spTree>
+      <p:nvGrpSpPr>
+        <p:cNvPr id="1" name=""/>
+        <p:cNvGrpSpPr/>
+        <p:nvPr/>
+      </p:nvGrpSpPr>
+      <p:grpSpPr>
+        <a:xfrm>
+          <a:off x="0" y="0"/>
+          <a:ext cx="0" cy="0"/>
+          <a:chOff x="0" y="0"/>
+          <a:chExt cx="0" cy="0"/>
+        </a:xfrm>
+      </p:grpSpPr>
+      <p:sp>
+        <p:nvSpPr>
+          <p:cNvPr id="2" name="Title 1">
+            <a:extLst>
+              <a:ext uri="{FF2B5EF4-FFF2-40B4-BE49-F238E27FC236}">
+                <a16:creationId xmlns:a16="http://schemas.microsoft.com/office/drawing/2014/main" id="{689A4F63-071A-8FF4-7AE4-1FDCE62A9A32}"/>
+              </a:ext>
+            </a:extLst>
+          </p:cNvPr>
+          <p:cNvSpPr>
+            <a:spLocks noGrp="1"/>
+          </p:cNvSpPr>
+          <p:nvPr>
+            <p:ph type="title"/>
+          </p:nvPr>
+        </p:nvSpPr>
+        <p:spPr/>
+        <p:txBody>
+          <a:bodyPr/>
+          <a:lstStyle/>
+          <a:p>
+            <a:r>
+              <a:rPr lang="en-GB" dirty="0"/>
+              <a:t>What is </a:t>
+            </a:r>
+            <a:r>
+              <a:rPr lang="en-GB" dirty="0" err="1"/>
+              <a:t>Zombono</a:t>
+            </a:r>
+            <a:r>
+              <a:rPr lang="en-GB" dirty="0"/>
+              <a:t>?</a:t>
+            </a:r>
+          </a:p>
+        </p:txBody>
+      </p:sp>
+      <p:sp>
+        <p:nvSpPr>
+          <p:cNvPr id="3" name="Content Placeholder 2">
+            <a:extLst>
+              <a:ext uri="{FF2B5EF4-FFF2-40B4-BE49-F238E27FC236}">
+                <a16:creationId xmlns:a16="http://schemas.microsoft.com/office/drawing/2014/main" id="{D1E921C6-46D3-A8FD-C6ED-48DB07F6CC53}"/>
+              </a:ext>
+            </a:extLst>
+          </p:cNvPr>
+          <p:cNvSpPr>
+            <a:spLocks noGrp="1"/>
+          </p:cNvSpPr>
+          <p:nvPr>
+            <p:ph idx="1"/>
+          </p:nvPr>
+        </p:nvSpPr>
+        <p:spPr>
+          <a:xfrm>
+            <a:off x="677334" y="946628"/>
+            <a:ext cx="8596668" cy="4943184"/>
+          </a:xfrm>
+        </p:spPr>
+        <p:txBody>
+          <a:bodyPr>
+            <a:normAutofit lnSpcReduction="10000"/>
+          </a:bodyPr>
+          <a:lstStyle/>
+          <a:p>
+            <a:r>
+              <a:rPr lang="en-GB" dirty="0"/>
+              <a:t>Multiplayer team-based FPS</a:t>
+            </a:r>
+          </a:p>
+          <a:p>
+            <a:r>
+              <a:rPr lang="en-GB" dirty="0"/>
+              <a:t>Think L4D2’s Directors x an old boomer shooter like Quake or Unreal Tournament</a:t>
+            </a:r>
+          </a:p>
+          <a:p>
+            <a:r>
+              <a:rPr lang="en-GB" dirty="0"/>
+              <a:t>Two teams</a:t>
+            </a:r>
+          </a:p>
+          <a:p>
+            <a:pPr lvl="1"/>
+            <a:r>
+              <a:rPr lang="en-GB" dirty="0"/>
+              <a:t>Directors: Entire focus is on spawning various monsters (zombies, zombies on speed, ogres…), special abilities to place in obstructions and also zombify players (need a counter to this)</a:t>
+            </a:r>
+          </a:p>
+          <a:p>
+            <a:pPr lvl="1"/>
+            <a:r>
+              <a:rPr lang="en-GB" dirty="0"/>
+              <a:t>Players: Somewhat traditional FPS weapons, although the focus is on speed and firepower as opposed to numbers (since you can spawn arbitrary numbers of enemies)</a:t>
+            </a:r>
+          </a:p>
+          <a:p>
+            <a:r>
+              <a:rPr lang="en-GB" dirty="0"/>
+              <a:t>Several modes planned</a:t>
+            </a:r>
+          </a:p>
+          <a:p>
+            <a:pPr lvl="1"/>
+            <a:r>
+              <a:rPr lang="en-GB" dirty="0"/>
+              <a:t>TDM (only one implemented currently), Co-op (8 level campaign), control point, tournament, hostage, waves, maybe more eventually planned</a:t>
+            </a:r>
+          </a:p>
+          <a:p>
+            <a:r>
+              <a:rPr lang="en-GB" dirty="0"/>
+              <a:t>Engine:</a:t>
+            </a:r>
+          </a:p>
+          <a:p>
+            <a:pPr lvl="1"/>
+            <a:r>
+              <a:rPr lang="en-GB" dirty="0"/>
+              <a:t>100% C…highly modified, modernised </a:t>
+            </a:r>
+            <a:r>
+              <a:rPr lang="en-GB" dirty="0" err="1"/>
+              <a:t>sourceport</a:t>
+            </a:r>
+            <a:r>
+              <a:rPr lang="en-GB" dirty="0"/>
+              <a:t> of classic Quake2</a:t>
+            </a:r>
+          </a:p>
+          <a:p>
+            <a:pPr lvl="1"/>
+            <a:r>
+              <a:rPr lang="en-GB" dirty="0"/>
+              <a:t>Now the question: Why make this choice?</a:t>
+            </a:r>
+          </a:p>
+        </p:txBody>
+      </p:sp>
+      <p:pic>
+        <p:nvPicPr>
+          <p:cNvPr id="5" name="Picture 4">
+            <a:extLst>
+              <a:ext uri="{FF2B5EF4-FFF2-40B4-BE49-F238E27FC236}">
+                <a16:creationId xmlns:a16="http://schemas.microsoft.com/office/drawing/2014/main" id="{CAE45437-A62B-BFE9-50CE-A69305E0BED6}"/>
+              </a:ext>
+            </a:extLst>
+          </p:cNvPr>
+          <p:cNvPicPr>
+            <a:picLocks noChangeAspect="1"/>
+          </p:cNvPicPr>
+          <p:nvPr/>
+        </p:nvPicPr>
+        <p:blipFill>
+          <a:blip r:embed="rId2"/>
+          <a:stretch>
+            <a:fillRect/>
+          </a:stretch>
+        </p:blipFill>
+        <p:spPr>
+          <a:xfrm>
+            <a:off x="8934185" y="74709"/>
+            <a:ext cx="3150239" cy="2456327"/>
+          </a:xfrm>
+          <a:prstGeom prst="rect">
+            <a:avLst/>
+          </a:prstGeom>
+        </p:spPr>
+      </p:pic>
+      <p:pic>
+        <p:nvPicPr>
+          <p:cNvPr id="7" name="Picture 6">
+            <a:extLst>
+              <a:ext uri="{FF2B5EF4-FFF2-40B4-BE49-F238E27FC236}">
+                <a16:creationId xmlns:a16="http://schemas.microsoft.com/office/drawing/2014/main" id="{58A6DD18-0371-A59F-663B-CAFF38E6AB1C}"/>
+              </a:ext>
+            </a:extLst>
+          </p:cNvPr>
+          <p:cNvPicPr>
+            <a:picLocks noChangeAspect="1"/>
+          </p:cNvPicPr>
+          <p:nvPr/>
+        </p:nvPicPr>
+        <p:blipFill>
+          <a:blip r:embed="rId3"/>
+          <a:stretch>
+            <a:fillRect/>
+          </a:stretch>
+        </p:blipFill>
+        <p:spPr>
+          <a:xfrm>
+            <a:off x="8934185" y="3571586"/>
+            <a:ext cx="3150239" cy="2456327"/>
+          </a:xfrm>
+          <a:prstGeom prst="rect">
+            <a:avLst/>
+          </a:prstGeom>
+        </p:spPr>
+      </p:pic>
+    </p:spTree>
+    <p:extLst>
+      <p:ext uri="{BB962C8B-B14F-4D97-AF65-F5344CB8AC3E}">
+        <p14:creationId xmlns:p14="http://schemas.microsoft.com/office/powerpoint/2010/main" val="4070128325"/>
+      </p:ext>
+    </p:extLst>
+  </p:cSld>
+  <p:clrMapOvr>
+    <a:masterClrMapping/>
+  </p:clrMapOvr>
+</p:sld>
+</file>
+
+<file path=ppt/slides/slide3.xml><?xml version="1.0" encoding="utf-8"?>
+<p:sld xmlns:a="http://schemas.openxmlformats.org/drawingml/2006/main" xmlns:r="http://schemas.openxmlformats.org/officeDocument/2006/relationships" xmlns:p="http://schemas.openxmlformats.org/presentationml/2006/main">
+  <p:cSld>
+    <p:spTree>
+      <p:nvGrpSpPr>
+        <p:cNvPr id="1" name=""/>
+        <p:cNvGrpSpPr/>
+        <p:nvPr/>
+      </p:nvGrpSpPr>
+      <p:grpSpPr>
+        <a:xfrm>
+          <a:off x="0" y="0"/>
+          <a:ext cx="0" cy="0"/>
+          <a:chOff x="0" y="0"/>
+          <a:chExt cx="0" cy="0"/>
+        </a:xfrm>
+      </p:grpSpPr>
+      <p:sp>
+        <p:nvSpPr>
+          <p:cNvPr id="2" name="Title 1">
+            <a:extLst>
+              <a:ext uri="{FF2B5EF4-FFF2-40B4-BE49-F238E27FC236}">
+                <a16:creationId xmlns:a16="http://schemas.microsoft.com/office/drawing/2014/main" id="{07D0B805-1887-F4C6-D4C9-CE0302227B75}"/>
+              </a:ext>
+            </a:extLst>
+          </p:cNvPr>
+          <p:cNvSpPr>
+            <a:spLocks noGrp="1"/>
+          </p:cNvSpPr>
+          <p:nvPr>
+            <p:ph type="title"/>
+          </p:nvPr>
+        </p:nvSpPr>
+        <p:spPr/>
+        <p:txBody>
+          <a:bodyPr/>
+          <a:lstStyle/>
+          <a:p>
+            <a:r>
+              <a:rPr lang="en-GB" dirty="0"/>
+              <a:t>Why such an old and strange choice of engine?</a:t>
+            </a:r>
+          </a:p>
+        </p:txBody>
+      </p:sp>
+      <p:sp>
+        <p:nvSpPr>
+          <p:cNvPr id="3" name="Content Placeholder 2">
+            <a:extLst>
+              <a:ext uri="{FF2B5EF4-FFF2-40B4-BE49-F238E27FC236}">
+                <a16:creationId xmlns:a16="http://schemas.microsoft.com/office/drawing/2014/main" id="{7C898D16-31E8-551A-0D9B-6DC8F20294E5}"/>
+              </a:ext>
+            </a:extLst>
+          </p:cNvPr>
+          <p:cNvSpPr>
+            <a:spLocks noGrp="1"/>
+          </p:cNvSpPr>
+          <p:nvPr>
+            <p:ph idx="1"/>
+          </p:nvPr>
+        </p:nvSpPr>
+        <p:spPr>
+          <a:xfrm>
+            <a:off x="677333" y="1607027"/>
+            <a:ext cx="9067302" cy="4354502"/>
+          </a:xfrm>
+        </p:spPr>
+        <p:txBody>
+          <a:bodyPr>
+            <a:normAutofit fontScale="92500" lnSpcReduction="10000"/>
+          </a:bodyPr>
+          <a:lstStyle/>
+          <a:p>
+            <a:r>
+              <a:rPr lang="en-GB" dirty="0"/>
+              <a:t>The game has a 90s boomer shooter aesthetic</a:t>
+            </a:r>
+          </a:p>
+          <a:p>
+            <a:pPr lvl="1"/>
+            <a:r>
+              <a:rPr lang="en-GB" dirty="0"/>
+              <a:t>Which the old engine obviously fits well with</a:t>
+            </a:r>
+          </a:p>
+          <a:p>
+            <a:r>
+              <a:rPr lang="en-GB" dirty="0"/>
+              <a:t>Very well designed (see next slide)</a:t>
+            </a:r>
+          </a:p>
+          <a:p>
+            <a:pPr lvl="1"/>
+            <a:r>
+              <a:rPr lang="en-GB" dirty="0"/>
+              <a:t>100% modular, with modules within those modules. Carmack and co. are a bit overblown, but he could at least write a very nice game engine</a:t>
+            </a:r>
+          </a:p>
+          <a:p>
+            <a:pPr lvl="1"/>
+            <a:r>
+              <a:rPr lang="en-GB" dirty="0"/>
+              <a:t>Provides total control of everything – you are accountable for everything down to the memory allocation and the interaction with the operating system of your chosen platforms (currently Windows and Linux)</a:t>
+            </a:r>
+          </a:p>
+          <a:p>
+            <a:pPr lvl="2"/>
+            <a:r>
+              <a:rPr lang="en-GB" dirty="0"/>
+              <a:t>Advantages: If a Unity/Unreal/Godot… bug screws you over, you are screwed. Not here…</a:t>
+            </a:r>
+          </a:p>
+          <a:p>
+            <a:pPr lvl="2"/>
+            <a:r>
+              <a:rPr lang="en-GB" dirty="0"/>
+              <a:t>Disadvantages: Far more code to maintain…that’s the fun part for me though! Maybe I’m a masochist…</a:t>
+            </a:r>
+          </a:p>
+          <a:p>
+            <a:r>
+              <a:rPr lang="en-GB" dirty="0"/>
+              <a:t>Highly documented</a:t>
+            </a:r>
+          </a:p>
+          <a:p>
+            <a:pPr lvl="1"/>
+            <a:r>
+              <a:rPr lang="en-GB" dirty="0"/>
+              <a:t>100% modular, with modules within those modules</a:t>
+            </a:r>
+          </a:p>
+          <a:p>
+            <a:pPr lvl="1"/>
+            <a:r>
+              <a:rPr lang="en-GB" dirty="0"/>
+              <a:t>Already used a pre-modernised </a:t>
+            </a:r>
+            <a:r>
+              <a:rPr lang="en-GB" dirty="0" err="1"/>
+              <a:t>sourceport</a:t>
+            </a:r>
+            <a:r>
+              <a:rPr lang="en-GB" dirty="0"/>
+              <a:t> (vkQuake2) with many changes…such as Vulkan rendering</a:t>
+            </a:r>
+          </a:p>
+          <a:p>
+            <a:pPr marL="457200" lvl="1" indent="0">
+              <a:buNone/>
+            </a:pPr>
+            <a:endParaRPr lang="en-GB" dirty="0"/>
+          </a:p>
+          <a:p>
+            <a:pPr marL="914400" lvl="2" indent="0">
+              <a:buNone/>
+            </a:pPr>
+            <a:endParaRPr lang="en-GB" dirty="0"/>
+          </a:p>
+          <a:p>
+            <a:pPr lvl="1"/>
+            <a:endParaRPr lang="en-GB" dirty="0"/>
+          </a:p>
+          <a:p>
+            <a:pPr lvl="1"/>
+            <a:endParaRPr lang="en-GB" dirty="0"/>
+          </a:p>
+        </p:txBody>
+      </p:sp>
+    </p:spTree>
+    <p:extLst>
+      <p:ext uri="{BB962C8B-B14F-4D97-AF65-F5344CB8AC3E}">
+        <p14:creationId xmlns:p14="http://schemas.microsoft.com/office/powerpoint/2010/main" val="1728508902"/>
+      </p:ext>
+    </p:extLst>
+  </p:cSld>
+  <p:clrMapOvr>
+    <a:masterClrMapping/>
+  </p:clrMapOvr>
+</p:sld>
+</file>
+
+<file path=ppt/slides/slide4.xml><?xml version="1.0" encoding="utf-8"?>
+<p:sld xmlns:a="http://schemas.openxmlformats.org/drawingml/2006/main" xmlns:r="http://schemas.openxmlformats.org/officeDocument/2006/relationships" xmlns:p="http://schemas.openxmlformats.org/presentationml/2006/main">
+  <p:cSld>
+    <p:spTree>
+      <p:nvGrpSpPr>
+        <p:cNvPr id="1" name=""/>
+        <p:cNvGrpSpPr/>
+        <p:nvPr/>
+      </p:nvGrpSpPr>
+      <p:grpSpPr>
+        <a:xfrm>
+          <a:off x="0" y="0"/>
+          <a:ext cx="0" cy="0"/>
+          <a:chOff x="0" y="0"/>
+          <a:chExt cx="0" cy="0"/>
+        </a:xfrm>
+      </p:grpSpPr>
+      <p:sp>
+        <p:nvSpPr>
+          <p:cNvPr id="2" name="Title 1">
+            <a:extLst>
+              <a:ext uri="{FF2B5EF4-FFF2-40B4-BE49-F238E27FC236}">
+                <a16:creationId xmlns:a16="http://schemas.microsoft.com/office/drawing/2014/main" id="{B8DA707A-C658-71CE-79C6-730AD3C6E7CF}"/>
+              </a:ext>
+            </a:extLst>
+          </p:cNvPr>
+          <p:cNvSpPr>
+            <a:spLocks noGrp="1"/>
+          </p:cNvSpPr>
+          <p:nvPr>
+            <p:ph type="title"/>
+          </p:nvPr>
+        </p:nvSpPr>
+        <p:spPr>
+          <a:xfrm>
+            <a:off x="677334" y="286228"/>
+            <a:ext cx="8596668" cy="655066"/>
+          </a:xfrm>
+        </p:spPr>
+        <p:txBody>
+          <a:bodyPr/>
+          <a:lstStyle/>
+          <a:p>
+            <a:r>
+              <a:rPr lang="en-GB" dirty="0"/>
+              <a:t>Engine Architecture</a:t>
+            </a:r>
+          </a:p>
+        </p:txBody>
+      </p:sp>
+      <p:sp>
+        <p:nvSpPr>
+          <p:cNvPr id="3" name="Content Placeholder 2">
+            <a:extLst>
+              <a:ext uri="{FF2B5EF4-FFF2-40B4-BE49-F238E27FC236}">
+                <a16:creationId xmlns:a16="http://schemas.microsoft.com/office/drawing/2014/main" id="{E3279736-211E-9F28-1052-F01E719508D7}"/>
+              </a:ext>
+            </a:extLst>
+          </p:cNvPr>
+          <p:cNvSpPr>
+            <a:spLocks noGrp="1"/>
+          </p:cNvSpPr>
+          <p:nvPr>
+            <p:ph idx="1"/>
+          </p:nvPr>
+        </p:nvSpPr>
+        <p:spPr/>
+        <p:txBody>
+          <a:bodyPr/>
+          <a:lstStyle/>
+          <a:p>
+            <a:endParaRPr lang="en-GB"/>
+          </a:p>
+        </p:txBody>
+      </p:sp>
+    </p:spTree>
+    <p:extLst>
+      <p:ext uri="{BB962C8B-B14F-4D97-AF65-F5344CB8AC3E}">
+        <p14:creationId xmlns:p14="http://schemas.microsoft.com/office/powerpoint/2010/main" val="237577241"/>
+      </p:ext>
+    </p:extLst>
+  </p:cSld>
+  <p:clrMapOvr>
+    <a:masterClrMapping/>
+  </p:clrMapOvr>
+</p:sld>
+</file>
+
+<file path=ppt/slides/slide5.xml><?xml version="1.0" encoding="utf-8"?>
+<p:sld xmlns:a="http://schemas.openxmlformats.org/drawingml/2006/main" xmlns:r="http://schemas.openxmlformats.org/officeDocument/2006/relationships" xmlns:p="http://schemas.openxmlformats.org/presentationml/2006/main">
+  <p:cSld>
+    <p:spTree>
+      <p:nvGrpSpPr>
+        <p:cNvPr id="1" name=""/>
+        <p:cNvGrpSpPr/>
+        <p:nvPr/>
+      </p:nvGrpSpPr>
+      <p:grpSpPr>
+        <a:xfrm>
+          <a:off x="0" y="0"/>
+          <a:ext cx="0" cy="0"/>
+          <a:chOff x="0" y="0"/>
+          <a:chExt cx="0" cy="0"/>
+        </a:xfrm>
+      </p:grpSpPr>
+      <p:sp>
+        <p:nvSpPr>
+          <p:cNvPr id="2" name="Title 1">
+            <a:extLst>
+              <a:ext uri="{FF2B5EF4-FFF2-40B4-BE49-F238E27FC236}">
+                <a16:creationId xmlns:a16="http://schemas.microsoft.com/office/drawing/2014/main" id="{CE8AB76B-4553-B25F-7D01-7FB5A9105BD3}"/>
+              </a:ext>
+            </a:extLst>
+          </p:cNvPr>
+          <p:cNvSpPr>
+            <a:spLocks noGrp="1"/>
+          </p:cNvSpPr>
+          <p:nvPr>
+            <p:ph type="title"/>
+          </p:nvPr>
+        </p:nvSpPr>
+        <p:spPr>
+          <a:xfrm>
+            <a:off x="677334" y="313122"/>
+            <a:ext cx="8596668" cy="637137"/>
+          </a:xfrm>
+        </p:spPr>
+        <p:txBody>
+          <a:bodyPr>
+            <a:normAutofit fontScale="90000"/>
+          </a:bodyPr>
+          <a:lstStyle/>
+          <a:p>
+            <a:r>
+              <a:rPr lang="en-GB" dirty="0"/>
+              <a:t>Engine overview: Modernisation</a:t>
+            </a:r>
+          </a:p>
+        </p:txBody>
+      </p:sp>
+      <p:sp>
+        <p:nvSpPr>
+          <p:cNvPr id="3" name="Content Placeholder 2">
+            <a:extLst>
+              <a:ext uri="{FF2B5EF4-FFF2-40B4-BE49-F238E27FC236}">
+                <a16:creationId xmlns:a16="http://schemas.microsoft.com/office/drawing/2014/main" id="{069FE494-C722-D76F-D99F-88279E24986A}"/>
+              </a:ext>
+            </a:extLst>
+          </p:cNvPr>
+          <p:cNvSpPr>
+            <a:spLocks noGrp="1"/>
+          </p:cNvSpPr>
+          <p:nvPr>
+            <p:ph idx="1"/>
+          </p:nvPr>
+        </p:nvSpPr>
+        <p:spPr>
+          <a:xfrm>
+            <a:off x="677334" y="950259"/>
+            <a:ext cx="8596668" cy="4794625"/>
+          </a:xfrm>
+        </p:spPr>
+        <p:txBody>
+          <a:bodyPr/>
+          <a:lstStyle/>
+          <a:p>
+            <a:r>
+              <a:rPr lang="en-GB" dirty="0"/>
+              <a:t>Based on vkquake2 (</a:t>
+            </a:r>
+            <a:r>
+              <a:rPr lang="en-GB" dirty="0">
+                <a:hlinkClick r:id="rId2"/>
+              </a:rPr>
+              <a:t>https://github.com/kondrak/vkQuake2</a:t>
+            </a:r>
+            <a:r>
+              <a:rPr lang="en-GB" dirty="0"/>
+              <a:t>) – based on principles of modernisation while keeping as much as possible</a:t>
+            </a:r>
+          </a:p>
+          <a:p>
+            <a:r>
+              <a:rPr lang="en-GB" dirty="0"/>
+              <a:t>Cut many things targeted at old, late 90s hardware</a:t>
+            </a:r>
+          </a:p>
+          <a:p>
+            <a:pPr lvl="1"/>
+            <a:r>
+              <a:rPr lang="en-GB" dirty="0"/>
+              <a:t>Software renderer (even a bargain bin laptop from 10 years ago can run the game)</a:t>
+            </a:r>
+          </a:p>
+          <a:p>
+            <a:pPr lvl="1"/>
+            <a:r>
+              <a:rPr lang="en-GB" dirty="0"/>
+              <a:t>3dfx Voodoo, Rendition, etc GPU support</a:t>
+            </a:r>
+          </a:p>
+          <a:p>
+            <a:pPr lvl="1"/>
+            <a:r>
+              <a:rPr lang="en-GB" dirty="0"/>
+              <a:t>Alpha AXP, PowerPC, other dead CPU architectures…</a:t>
+            </a:r>
+          </a:p>
+          <a:p>
+            <a:pPr lvl="1"/>
+            <a:r>
+              <a:rPr lang="en-GB" dirty="0"/>
+              <a:t>Dead operating systems, like SunOS, IRIX…</a:t>
+            </a:r>
+          </a:p>
+          <a:p>
+            <a:pPr lvl="1"/>
+            <a:r>
+              <a:rPr lang="en-GB" dirty="0"/>
+              <a:t>Optimisations for dialup modem (how did anyone play online at 33.6K…)</a:t>
+            </a:r>
+          </a:p>
+          <a:p>
+            <a:pPr lvl="1"/>
+            <a:r>
+              <a:rPr lang="en-GB" dirty="0"/>
+              <a:t>Horrendous proprietary video format (wave files with delta compressed PCX images…WHAT)</a:t>
+            </a:r>
+          </a:p>
+          <a:p>
+            <a:pPr lvl="1"/>
+            <a:r>
+              <a:rPr lang="en-GB" dirty="0"/>
+              <a:t>Windows 95 specific code</a:t>
+            </a:r>
+          </a:p>
+          <a:p>
+            <a:pPr lvl="1"/>
+            <a:r>
+              <a:rPr lang="en-GB" dirty="0"/>
+              <a:t>Textures changed to 32-bit colour TGA (support already in engine) from 8-bit PCX</a:t>
+            </a:r>
+          </a:p>
+          <a:p>
+            <a:pPr lvl="1"/>
+            <a:r>
+              <a:rPr lang="en-GB" dirty="0"/>
+              <a:t>Etc </a:t>
+            </a:r>
+            <a:r>
+              <a:rPr lang="en-GB" dirty="0" err="1"/>
+              <a:t>etc</a:t>
+            </a:r>
+            <a:r>
+              <a:rPr lang="en-GB" dirty="0"/>
+              <a:t> </a:t>
+            </a:r>
+            <a:r>
+              <a:rPr lang="en-GB" dirty="0" err="1"/>
+              <a:t>etc</a:t>
+            </a:r>
+            <a:r>
+              <a:rPr lang="en-GB" dirty="0"/>
+              <a:t>…</a:t>
+            </a:r>
+          </a:p>
+        </p:txBody>
+      </p:sp>
+    </p:spTree>
+    <p:extLst>
+      <p:ext uri="{BB962C8B-B14F-4D97-AF65-F5344CB8AC3E}">
+        <p14:creationId xmlns:p14="http://schemas.microsoft.com/office/powerpoint/2010/main" val="1162989781"/>
+      </p:ext>
+    </p:extLst>
+  </p:cSld>
+  <p:clrMapOvr>
+    <a:masterClrMapping/>
+  </p:clrMapOvr>
+</p:sld>
+</file>
+
+<file path=ppt/slides/slide6.xml><?xml version="1.0" encoding="utf-8"?>
+<p:sld xmlns:a="http://schemas.openxmlformats.org/drawingml/2006/main" xmlns:r="http://schemas.openxmlformats.org/officeDocument/2006/relationships" xmlns:p="http://schemas.openxmlformats.org/presentationml/2006/main">
+  <p:cSld>
+    <p:spTree>
+      <p:nvGrpSpPr>
+        <p:cNvPr id="1" name=""/>
+        <p:cNvGrpSpPr/>
+        <p:nvPr/>
+      </p:nvGrpSpPr>
+      <p:grpSpPr>
+        <a:xfrm>
+          <a:off x="0" y="0"/>
+          <a:ext cx="0" cy="0"/>
+          <a:chOff x="0" y="0"/>
+          <a:chExt cx="0" cy="0"/>
+        </a:xfrm>
+      </p:grpSpPr>
+      <p:sp>
+        <p:nvSpPr>
+          <p:cNvPr id="2" name="Title 1">
+            <a:extLst>
+              <a:ext uri="{FF2B5EF4-FFF2-40B4-BE49-F238E27FC236}">
+                <a16:creationId xmlns:a16="http://schemas.microsoft.com/office/drawing/2014/main" id="{A2139EAF-90DB-32BF-E49C-49260249A0DB}"/>
+              </a:ext>
+            </a:extLst>
+          </p:cNvPr>
+          <p:cNvSpPr>
+            <a:spLocks noGrp="1"/>
+          </p:cNvSpPr>
+          <p:nvPr>
+            <p:ph type="title"/>
+          </p:nvPr>
+        </p:nvSpPr>
+        <p:spPr>
+          <a:xfrm>
+            <a:off x="677334" y="286228"/>
+            <a:ext cx="8596668" cy="664031"/>
+          </a:xfrm>
+        </p:spPr>
+        <p:txBody>
+          <a:bodyPr/>
+          <a:lstStyle/>
+          <a:p>
+            <a:r>
+              <a:rPr lang="en-GB" dirty="0"/>
+              <a:t>Engine overview: Rendering</a:t>
+            </a:r>
+          </a:p>
+        </p:txBody>
+      </p:sp>
+      <p:sp>
+        <p:nvSpPr>
+          <p:cNvPr id="3" name="Content Placeholder 2">
+            <a:extLst>
+              <a:ext uri="{FF2B5EF4-FFF2-40B4-BE49-F238E27FC236}">
+                <a16:creationId xmlns:a16="http://schemas.microsoft.com/office/drawing/2014/main" id="{F86C682A-8F42-6C38-D620-2C19269D3B8D}"/>
+              </a:ext>
+            </a:extLst>
+          </p:cNvPr>
+          <p:cNvSpPr>
+            <a:spLocks noGrp="1"/>
+          </p:cNvSpPr>
+          <p:nvPr>
+            <p:ph idx="1"/>
+          </p:nvPr>
+        </p:nvSpPr>
+        <p:spPr>
+          <a:xfrm>
+            <a:off x="677333" y="1075765"/>
+            <a:ext cx="8950761" cy="4642225"/>
+          </a:xfrm>
+        </p:spPr>
+        <p:txBody>
+          <a:bodyPr>
+            <a:normAutofit fontScale="92500" lnSpcReduction="20000"/>
+          </a:bodyPr>
+          <a:lstStyle/>
+          <a:p>
+            <a:r>
+              <a:rPr lang="en-GB" dirty="0"/>
+              <a:t>Original engine had software, OpenGL 1, and the </a:t>
+            </a:r>
+            <a:r>
+              <a:rPr lang="en-GB" dirty="0" err="1"/>
+              <a:t>sourceport</a:t>
+            </a:r>
+            <a:r>
+              <a:rPr lang="en-GB" dirty="0"/>
+              <a:t> added Vulkan </a:t>
+            </a:r>
+          </a:p>
+          <a:p>
+            <a:r>
+              <a:rPr lang="en-GB" dirty="0"/>
+              <a:t>Let’s use Vulkan only since the </a:t>
+            </a:r>
+            <a:r>
+              <a:rPr lang="en-GB" dirty="0" err="1"/>
+              <a:t>sourceport</a:t>
+            </a:r>
+            <a:r>
+              <a:rPr lang="en-GB" dirty="0"/>
+              <a:t> uses Vulkan…</a:t>
+            </a:r>
+          </a:p>
+          <a:p>
+            <a:pPr lvl="1"/>
+            <a:r>
+              <a:rPr lang="en-GB" dirty="0"/>
+              <a:t>…Vulkan renderer is a hacked up OpenGL 1.x renderer. WTF?</a:t>
+            </a:r>
+          </a:p>
+          <a:p>
+            <a:pPr lvl="1"/>
+            <a:r>
+              <a:rPr lang="en-GB" dirty="0"/>
+              <a:t>Actually don’t know Vulkan </a:t>
+            </a:r>
+          </a:p>
+          <a:p>
+            <a:pPr lvl="2"/>
+            <a:r>
+              <a:rPr lang="en-GB" dirty="0"/>
+              <a:t>Can’t take that long to learn…</a:t>
+            </a:r>
+          </a:p>
+          <a:p>
+            <a:pPr lvl="2"/>
+            <a:r>
+              <a:rPr lang="en-GB" dirty="0"/>
+              <a:t>Oh</a:t>
+            </a:r>
+          </a:p>
+          <a:p>
+            <a:r>
+              <a:rPr lang="en-GB" dirty="0"/>
+              <a:t>Okay, let’s actually write an OpenGL 3 renderer, and in the meantime, modernise and fix the OpenGL 1 renderer</a:t>
+            </a:r>
+          </a:p>
+          <a:p>
+            <a:pPr lvl="1"/>
+            <a:r>
+              <a:rPr lang="en-GB" dirty="0"/>
+              <a:t>Broken alpha function…Apparently 0 and 0.666 are the same thing. What?</a:t>
+            </a:r>
+          </a:p>
+          <a:p>
+            <a:pPr lvl="1"/>
+            <a:r>
+              <a:rPr lang="en-GB" dirty="0"/>
+              <a:t>More colour support</a:t>
+            </a:r>
+          </a:p>
+          <a:p>
+            <a:pPr lvl="1"/>
+            <a:r>
+              <a:rPr lang="en-GB" dirty="0"/>
+              <a:t>Rendering areas of textures</a:t>
+            </a:r>
+          </a:p>
+          <a:p>
+            <a:pPr lvl="1"/>
+            <a:r>
+              <a:rPr lang="en-GB" dirty="0"/>
+              <a:t>Other bugfixes</a:t>
+            </a:r>
+          </a:p>
+          <a:p>
+            <a:pPr lvl="1"/>
+            <a:r>
+              <a:rPr lang="en-GB" dirty="0"/>
+              <a:t>Custom OpenGL bindings (“</a:t>
+            </a:r>
+            <a:r>
+              <a:rPr lang="en-GB" dirty="0" err="1"/>
+              <a:t>Qgl</a:t>
+            </a:r>
+            <a:r>
+              <a:rPr lang="en-GB" dirty="0"/>
+              <a:t>”)…GLAD didn’t exist yet. Replace them with GLAD.</a:t>
+            </a:r>
+          </a:p>
+          <a:p>
+            <a:r>
+              <a:rPr lang="en-GB" dirty="0"/>
+              <a:t>GL3 renderer will be completely new codebase</a:t>
+            </a:r>
+          </a:p>
+          <a:p>
+            <a:pPr lvl="1"/>
+            <a:r>
+              <a:rPr lang="en-GB" dirty="0"/>
+              <a:t>Nothing from old renderer</a:t>
+            </a:r>
+          </a:p>
+          <a:p>
+            <a:pPr lvl="1"/>
+            <a:endParaRPr lang="en-GB" dirty="0"/>
+          </a:p>
+          <a:p>
+            <a:pPr marL="457200" lvl="1" indent="0">
+              <a:buNone/>
+            </a:pPr>
+            <a:endParaRPr lang="en-GB" dirty="0"/>
+          </a:p>
+          <a:p>
+            <a:pPr lvl="1"/>
+            <a:endParaRPr lang="en-GB" dirty="0"/>
+          </a:p>
+        </p:txBody>
+      </p:sp>
+    </p:spTree>
+    <p:extLst>
+      <p:ext uri="{BB962C8B-B14F-4D97-AF65-F5344CB8AC3E}">
+        <p14:creationId xmlns:p14="http://schemas.microsoft.com/office/powerpoint/2010/main" val="1949231163"/>
+      </p:ext>
+    </p:extLst>
+  </p:cSld>
+  <p:clrMapOvr>
+    <a:masterClrMapping/>
+  </p:clrMapOvr>
+</p:sld>
+</file>
+
+<file path=ppt/slides/slide7.xml><?xml version="1.0" encoding="utf-8"?>
+<p:sld xmlns:a="http://schemas.openxmlformats.org/drawingml/2006/main" xmlns:r="http://schemas.openxmlformats.org/officeDocument/2006/relationships" xmlns:p="http://schemas.openxmlformats.org/presentationml/2006/main">
+  <p:cSld>
+    <p:spTree>
+      <p:nvGrpSpPr>
+        <p:cNvPr id="1" name=""/>
+        <p:cNvGrpSpPr/>
+        <p:nvPr/>
+      </p:nvGrpSpPr>
+      <p:grpSpPr>
+        <a:xfrm>
+          <a:off x="0" y="0"/>
+          <a:ext cx="0" cy="0"/>
+          <a:chOff x="0" y="0"/>
+          <a:chExt cx="0" cy="0"/>
+        </a:xfrm>
+      </p:grpSpPr>
+      <p:sp>
+        <p:nvSpPr>
+          <p:cNvPr id="2" name="Title 1">
+            <a:extLst>
+              <a:ext uri="{FF2B5EF4-FFF2-40B4-BE49-F238E27FC236}">
+                <a16:creationId xmlns:a16="http://schemas.microsoft.com/office/drawing/2014/main" id="{A60D5C19-BCB1-96B2-4C2D-63BF028C6E33}"/>
+              </a:ext>
+            </a:extLst>
+          </p:cNvPr>
+          <p:cNvSpPr>
+            <a:spLocks noGrp="1"/>
+          </p:cNvSpPr>
+          <p:nvPr>
+            <p:ph type="title"/>
+          </p:nvPr>
+        </p:nvSpPr>
+        <p:spPr>
+          <a:xfrm>
+            <a:off x="677334" y="286228"/>
+            <a:ext cx="8596668" cy="699890"/>
+          </a:xfrm>
+        </p:spPr>
+        <p:txBody>
+          <a:bodyPr/>
+          <a:lstStyle/>
+          <a:p>
+            <a:r>
+              <a:rPr lang="en-GB" dirty="0"/>
+              <a:t>Engine overview (cont.)</a:t>
+            </a:r>
+          </a:p>
+        </p:txBody>
+      </p:sp>
+      <p:sp>
+        <p:nvSpPr>
+          <p:cNvPr id="3" name="Content Placeholder 2">
+            <a:extLst>
+              <a:ext uri="{FF2B5EF4-FFF2-40B4-BE49-F238E27FC236}">
+                <a16:creationId xmlns:a16="http://schemas.microsoft.com/office/drawing/2014/main" id="{0306A27C-B60E-3B8C-2B4A-F05364753049}"/>
+              </a:ext>
+            </a:extLst>
+          </p:cNvPr>
+          <p:cNvSpPr>
+            <a:spLocks noGrp="1"/>
+          </p:cNvSpPr>
+          <p:nvPr>
+            <p:ph idx="1"/>
+          </p:nvPr>
+        </p:nvSpPr>
+        <p:spPr>
+          <a:xfrm>
+            <a:off x="677334" y="986119"/>
+            <a:ext cx="8596668" cy="4731872"/>
+          </a:xfrm>
+        </p:spPr>
+        <p:txBody>
+          <a:bodyPr/>
+          <a:lstStyle/>
+          <a:p>
+            <a:r>
+              <a:rPr lang="en-GB" dirty="0"/>
+              <a:t>Completely replaced UI system</a:t>
+            </a:r>
+          </a:p>
+          <a:p>
+            <a:pPr lvl="1"/>
+            <a:r>
+              <a:rPr lang="en-GB" dirty="0"/>
+              <a:t>New set of controls</a:t>
+            </a:r>
+          </a:p>
+          <a:p>
+            <a:pPr lvl="1"/>
+            <a:r>
+              <a:rPr lang="en-GB" dirty="0"/>
+              <a:t>Can be customised from files by a mod developer instead of being hardcoded in the engine and sent as strings over the network (WTF?)</a:t>
+            </a:r>
+          </a:p>
+          <a:p>
+            <a:r>
+              <a:rPr lang="en-GB" dirty="0"/>
+              <a:t>Text completely rewritten</a:t>
+            </a:r>
+          </a:p>
+          <a:p>
+            <a:pPr lvl="1"/>
+            <a:r>
+              <a:rPr lang="en-GB" i="1" dirty="0"/>
+              <a:t>N </a:t>
+            </a:r>
+            <a:r>
+              <a:rPr lang="en-GB" dirty="0"/>
+              <a:t>fonts, </a:t>
+            </a:r>
+            <a:r>
+              <a:rPr lang="en-GB" i="1" dirty="0"/>
+              <a:t>N </a:t>
+            </a:r>
+            <a:r>
+              <a:rPr lang="en-GB" dirty="0"/>
+              <a:t>font styles, </a:t>
+            </a:r>
+            <a:r>
+              <a:rPr lang="en-GB" i="1" dirty="0"/>
+              <a:t>N </a:t>
+            </a:r>
+            <a:r>
+              <a:rPr lang="en-GB" dirty="0"/>
+              <a:t>glyphs, </a:t>
+            </a:r>
+            <a:r>
+              <a:rPr lang="en-GB" i="1" dirty="0"/>
+              <a:t>N </a:t>
+            </a:r>
+            <a:endParaRPr lang="en-GB" dirty="0"/>
+          </a:p>
+          <a:p>
+            <a:pPr lvl="1"/>
+            <a:r>
+              <a:rPr lang="en-GB" dirty="0"/>
+              <a:t>Image fonts combined with Json files for recognition (used open source JSON library for this)</a:t>
+            </a:r>
+          </a:p>
+          <a:p>
+            <a:pPr lvl="1"/>
+            <a:r>
+              <a:rPr lang="en-GB" dirty="0"/>
+              <a:t>Quake 3 colour codes with custom extensions</a:t>
+            </a:r>
+          </a:p>
+          <a:p>
+            <a:r>
+              <a:rPr lang="en-GB" dirty="0"/>
+              <a:t>Protocol improvements</a:t>
+            </a:r>
+          </a:p>
+          <a:p>
+            <a:pPr lvl="1"/>
+            <a:r>
+              <a:rPr lang="en-GB" dirty="0"/>
+              <a:t>11x larger levels than original game’s (12.3 fixed point coordinates removed)</a:t>
+            </a:r>
+          </a:p>
+          <a:p>
+            <a:pPr lvl="1"/>
+            <a:r>
+              <a:rPr lang="en-GB" dirty="0"/>
+              <a:t>Original limitations removed such as with entity number</a:t>
+            </a:r>
+          </a:p>
+        </p:txBody>
+      </p:sp>
+    </p:spTree>
+    <p:extLst>
+      <p:ext uri="{BB962C8B-B14F-4D97-AF65-F5344CB8AC3E}">
+        <p14:creationId xmlns:p14="http://schemas.microsoft.com/office/powerpoint/2010/main" val="226438614"/>
+      </p:ext>
+    </p:extLst>
+  </p:cSld>
+  <p:clrMapOvr>
+    <a:masterClrMapping/>
+  </p:clrMapOvr>
+</p:sld>
+</file>
+
+<file path=ppt/slides/slide8.xml><?xml version="1.0" encoding="utf-8"?>
+<p:sld xmlns:a="http://schemas.openxmlformats.org/drawingml/2006/main" xmlns:r="http://schemas.openxmlformats.org/officeDocument/2006/relationships" xmlns:p="http://schemas.openxmlformats.org/presentationml/2006/main">
+  <p:cSld>
+    <p:spTree>
+      <p:nvGrpSpPr>
+        <p:cNvPr id="1" name=""/>
+        <p:cNvGrpSpPr/>
+        <p:nvPr/>
+      </p:nvGrpSpPr>
+      <p:grpSpPr>
+        <a:xfrm>
+          <a:off x="0" y="0"/>
+          <a:ext cx="0" cy="0"/>
+          <a:chOff x="0" y="0"/>
+          <a:chExt cx="0" cy="0"/>
+        </a:xfrm>
+      </p:grpSpPr>
+      <p:sp>
+        <p:nvSpPr>
+          <p:cNvPr id="2" name="Title 1">
+            <a:extLst>
+              <a:ext uri="{FF2B5EF4-FFF2-40B4-BE49-F238E27FC236}">
+                <a16:creationId xmlns:a16="http://schemas.microsoft.com/office/drawing/2014/main" id="{8C442FFB-2620-0A74-F849-51A1F593EDFA}"/>
+              </a:ext>
+            </a:extLst>
+          </p:cNvPr>
+          <p:cNvSpPr>
+            <a:spLocks noGrp="1"/>
+          </p:cNvSpPr>
+          <p:nvPr>
+            <p:ph type="title"/>
+          </p:nvPr>
+        </p:nvSpPr>
+        <p:spPr>
+          <a:xfrm>
+            <a:off x="677334" y="286228"/>
+            <a:ext cx="8596668" cy="672996"/>
+          </a:xfrm>
+        </p:spPr>
+        <p:txBody>
+          <a:bodyPr/>
+          <a:lstStyle/>
+          <a:p>
+            <a:r>
+              <a:rPr lang="en-GB" dirty="0"/>
+              <a:t>Engine overview: Levels</a:t>
+            </a:r>
+          </a:p>
+        </p:txBody>
+      </p:sp>
+      <p:sp>
+        <p:nvSpPr>
+          <p:cNvPr id="3" name="Content Placeholder 2">
+            <a:extLst>
+              <a:ext uri="{FF2B5EF4-FFF2-40B4-BE49-F238E27FC236}">
+                <a16:creationId xmlns:a16="http://schemas.microsoft.com/office/drawing/2014/main" id="{359E3762-ACAD-DFA1-C9FB-5F268C84F1CE}"/>
+              </a:ext>
+            </a:extLst>
+          </p:cNvPr>
+          <p:cNvSpPr>
+            <a:spLocks noGrp="1"/>
+          </p:cNvSpPr>
+          <p:nvPr>
+            <p:ph idx="1"/>
+          </p:nvPr>
+        </p:nvSpPr>
+        <p:spPr/>
+        <p:txBody>
+          <a:bodyPr/>
+          <a:lstStyle/>
+          <a:p>
+            <a:endParaRPr lang="en-GB" dirty="0"/>
+          </a:p>
+        </p:txBody>
+      </p:sp>
+    </p:spTree>
+    <p:extLst>
+      <p:ext uri="{BB962C8B-B14F-4D97-AF65-F5344CB8AC3E}">
+        <p14:creationId xmlns:p14="http://schemas.microsoft.com/office/powerpoint/2010/main" val="2738155842"/>
+      </p:ext>
+    </p:extLst>
+  </p:cSld>
+  <p:clrMapOvr>
+    <a:masterClrMapping/>
+  </p:clrMapOvr>
+</p:sld>
+</file>
+
+<file path=ppt/slides/slide9.xml><?xml version="1.0" encoding="utf-8"?>
+<p:sld xmlns:a="http://schemas.openxmlformats.org/drawingml/2006/main" xmlns:r="http://schemas.openxmlformats.org/officeDocument/2006/relationships" xmlns:p="http://schemas.openxmlformats.org/presentationml/2006/main">
+  <p:cSld>
+    <p:spTree>
+      <p:nvGrpSpPr>
+        <p:cNvPr id="1" name=""/>
+        <p:cNvGrpSpPr/>
+        <p:nvPr/>
+      </p:nvGrpSpPr>
+      <p:grpSpPr>
+        <a:xfrm>
+          <a:off x="0" y="0"/>
+          <a:ext cx="0" cy="0"/>
+          <a:chOff x="0" y="0"/>
+          <a:chExt cx="0" cy="0"/>
+        </a:xfrm>
+      </p:grpSpPr>
+      <p:sp>
+        <p:nvSpPr>
+          <p:cNvPr id="2" name="Title 1">
+            <a:extLst>
+              <a:ext uri="{FF2B5EF4-FFF2-40B4-BE49-F238E27FC236}">
+                <a16:creationId xmlns:a16="http://schemas.microsoft.com/office/drawing/2014/main" id="{D9E4EB12-C4E5-CA84-F5DC-0BFFB68BEDA5}"/>
+              </a:ext>
+            </a:extLst>
+          </p:cNvPr>
+          <p:cNvSpPr>
+            <a:spLocks noGrp="1"/>
+          </p:cNvSpPr>
+          <p:nvPr>
+            <p:ph type="title"/>
+          </p:nvPr>
+        </p:nvSpPr>
+        <p:spPr>
+          <a:xfrm>
+            <a:off x="677334" y="286228"/>
+            <a:ext cx="8596668" cy="628172"/>
+          </a:xfrm>
+        </p:spPr>
+        <p:txBody>
+          <a:bodyPr>
+            <a:normAutofit fontScale="90000"/>
+          </a:bodyPr>
+          <a:lstStyle/>
+          <a:p>
+            <a:r>
+              <a:rPr lang="en-GB" dirty="0"/>
+              <a:t>Now for the actual game…</a:t>
+            </a:r>
+          </a:p>
+        </p:txBody>
+      </p:sp>
+      <p:sp>
+        <p:nvSpPr>
+          <p:cNvPr id="3" name="Content Placeholder 2">
+            <a:extLst>
+              <a:ext uri="{FF2B5EF4-FFF2-40B4-BE49-F238E27FC236}">
+                <a16:creationId xmlns:a16="http://schemas.microsoft.com/office/drawing/2014/main" id="{BBBFA31E-F7E4-E1E1-B044-4009983AB838}"/>
+              </a:ext>
+            </a:extLst>
+          </p:cNvPr>
+          <p:cNvSpPr>
+            <a:spLocks noGrp="1"/>
+          </p:cNvSpPr>
+          <p:nvPr>
+            <p:ph idx="1"/>
+          </p:nvPr>
+        </p:nvSpPr>
+        <p:spPr>
+          <a:xfrm>
+            <a:off x="677334" y="914401"/>
+            <a:ext cx="8596668" cy="4803590"/>
+          </a:xfrm>
+        </p:spPr>
+        <p:txBody>
+          <a:bodyPr/>
+          <a:lstStyle/>
+          <a:p>
+            <a:r>
+              <a:rPr lang="en-GB" dirty="0"/>
+              <a:t>Best to play it to demo what it is</a:t>
+            </a:r>
+          </a:p>
+        </p:txBody>
+      </p:sp>
+    </p:spTree>
+    <p:extLst>
+      <p:ext uri="{BB962C8B-B14F-4D97-AF65-F5344CB8AC3E}">
+        <p14:creationId xmlns:p14="http://schemas.microsoft.com/office/powerpoint/2010/main" val="1609570957"/>
+      </p:ext>
+    </p:extLst>
+  </p:cSld>
+  <p:clrMapOvr>
+    <a:masterClrMapping/>
+  </p:clrMapOvr>
+</p:sld>
+</file>
+
 <file path=ppt/theme/theme1.xml><?xml version="1.0" encoding="utf-8"?>
 <a:theme xmlns:a="http://schemas.openxmlformats.org/drawingml/2006/main" name="Facet">
   <a:themeElements>
-    <a:clrScheme name="Facet">
+    <a:clrScheme name="Blue">
       <a:dk1>
         <a:sysClr val="windowText" lastClr="000000"/>
       </a:dk1>
@@ -5937,34 +8412,34 @@
         <a:sysClr val="window" lastClr="FFFFFF"/>
       </a:lt1>
       <a:dk2>
-        <a:srgbClr val="2C3C43"/>
+        <a:srgbClr val="17406D"/>
       </a:dk2>
       <a:lt2>
-        <a:srgbClr val="EBEBEB"/>
+        <a:srgbClr val="DBEFF9"/>
       </a:lt2>
       <a:accent1>
-        <a:srgbClr val="90C226"/>
+        <a:srgbClr val="0F6FC6"/>
       </a:accent1>
       <a:accent2>
-        <a:srgbClr val="54A021"/>
+        <a:srgbClr val="009DD9"/>
       </a:accent2>
       <a:accent3>
-        <a:srgbClr val="E6B91E"/>
+        <a:srgbClr val="0BD0D9"/>
       </a:accent3>
       <a:accent4>
-        <a:srgbClr val="E76618"/>
+        <a:srgbClr val="10CF9B"/>
       </a:accent4>
       <a:accent5>
-        <a:srgbClr val="C42F1A"/>
+        <a:srgbClr val="7CCA62"/>
       </a:accent5>
       <a:accent6>
-        <a:srgbClr val="918655"/>
+        <a:srgbClr val="A5C249"/>
       </a:accent6>
       <a:hlink>
-        <a:srgbClr val="99CA3C"/>
+        <a:srgbClr val="F49100"/>
       </a:hlink>
       <a:folHlink>
-        <a:srgbClr val="B9D181"/>
+        <a:srgbClr val="85DFD0"/>
       </a:folHlink>
     </a:clrScheme>
     <a:fontScheme name="Facet">

</xml_diff>

<commit_message>
reorganise source files even more and change zombie health
</commit_message>
<xml_diff>
--- a/docs/3-29-24 GlosGameDevs.pptx
+++ b/docs/3-29-24 GlosGameDevs.pptx
@@ -13,7 +13,8 @@
     <p:sldId id="260" r:id="rId7"/>
     <p:sldId id="263" r:id="rId8"/>
     <p:sldId id="264" r:id="rId9"/>
-    <p:sldId id="261" r:id="rId10"/>
+    <p:sldId id="265" r:id="rId10"/>
+    <p:sldId id="261" r:id="rId11"/>
   </p:sldIdLst>
   <p:sldSz cx="12192000" cy="6858000"/>
   <p:notesSz cx="6858000" cy="9144000"/>
@@ -890,12 +891,25 @@
           <a:p>
             <a:r>
               <a:rPr lang="en-GB" sz="2400" dirty="0">
-                <a:hlinkClick r:id="rId3"/>
+                <a:solidFill>
+                  <a:schemeClr val="tx1"/>
+                </a:solidFill>
+                <a:hlinkClick r:id="rId3">
+                  <a:extLst>
+                    <a:ext uri="{A12FA001-AC4F-418D-AE19-62706E023703}">
+                      <ahyp:hlinkClr xmlns:ahyp="http://schemas.microsoft.com/office/drawing/2018/hyperlinkcolor" val="tx"/>
+                    </a:ext>
+                  </a:extLst>
+                </a:hlinkClick>
               </a:rPr>
               <a:t>https://zombono.com/</a:t>
             </a:r>
             <a:r>
-              <a:rPr lang="en-GB" sz="2400" dirty="0"/>
+              <a:rPr lang="en-GB" sz="2400" dirty="0">
+                <a:solidFill>
+                  <a:schemeClr val="tx1"/>
+                </a:solidFill>
+              </a:rPr>
               <a:t> </a:t>
             </a:r>
           </a:p>
@@ -1218,12 +1232,25 @@
           <a:p>
             <a:r>
               <a:rPr lang="en-GB" sz="2400" dirty="0">
-                <a:hlinkClick r:id="rId3"/>
+                <a:solidFill>
+                  <a:schemeClr val="tx1"/>
+                </a:solidFill>
+                <a:hlinkClick r:id="rId3">
+                  <a:extLst>
+                    <a:ext uri="{A12FA001-AC4F-418D-AE19-62706E023703}">
+                      <ahyp:hlinkClr xmlns:ahyp="http://schemas.microsoft.com/office/drawing/2018/hyperlinkcolor" val="tx"/>
+                    </a:ext>
+                  </a:extLst>
+                </a:hlinkClick>
               </a:rPr>
               <a:t>https://zombono.com/</a:t>
             </a:r>
             <a:r>
-              <a:rPr lang="en-GB" sz="2400" dirty="0"/>
+              <a:rPr lang="en-GB" sz="2400" dirty="0">
+                <a:solidFill>
+                  <a:schemeClr val="tx1"/>
+                </a:solidFill>
+              </a:rPr>
               <a:t> </a:t>
             </a:r>
           </a:p>
@@ -1699,12 +1726,25 @@
           <a:p>
             <a:r>
               <a:rPr lang="en-GB" sz="2400" dirty="0">
-                <a:hlinkClick r:id="rId3"/>
+                <a:solidFill>
+                  <a:schemeClr val="tx1"/>
+                </a:solidFill>
+                <a:hlinkClick r:id="rId3">
+                  <a:extLst>
+                    <a:ext uri="{A12FA001-AC4F-418D-AE19-62706E023703}">
+                      <ahyp:hlinkClr xmlns:ahyp="http://schemas.microsoft.com/office/drawing/2018/hyperlinkcolor" val="tx"/>
+                    </a:ext>
+                  </a:extLst>
+                </a:hlinkClick>
               </a:rPr>
               <a:t>https://zombono.com/</a:t>
             </a:r>
             <a:r>
-              <a:rPr lang="en-GB" sz="2400" dirty="0"/>
+              <a:rPr lang="en-GB" sz="2400" dirty="0">
+                <a:solidFill>
+                  <a:schemeClr val="tx1"/>
+                </a:solidFill>
+              </a:rPr>
               <a:t> </a:t>
             </a:r>
           </a:p>
@@ -2027,12 +2067,25 @@
           <a:p>
             <a:r>
               <a:rPr lang="en-GB" sz="2400" dirty="0">
-                <a:hlinkClick r:id="rId3"/>
+                <a:solidFill>
+                  <a:schemeClr val="tx1"/>
+                </a:solidFill>
+                <a:hlinkClick r:id="rId3">
+                  <a:extLst>
+                    <a:ext uri="{A12FA001-AC4F-418D-AE19-62706E023703}">
+                      <ahyp:hlinkClr xmlns:ahyp="http://schemas.microsoft.com/office/drawing/2018/hyperlinkcolor" val="tx"/>
+                    </a:ext>
+                  </a:extLst>
+                </a:hlinkClick>
               </a:rPr>
               <a:t>https://zombono.com/</a:t>
             </a:r>
             <a:r>
-              <a:rPr lang="en-GB" sz="2400" dirty="0"/>
+              <a:rPr lang="en-GB" sz="2400" dirty="0">
+                <a:solidFill>
+                  <a:schemeClr val="tx1"/>
+                </a:solidFill>
+              </a:rPr>
               <a:t> </a:t>
             </a:r>
           </a:p>
@@ -2500,12 +2553,25 @@
           <a:p>
             <a:r>
               <a:rPr lang="en-GB" sz="2400" dirty="0">
-                <a:hlinkClick r:id="rId3"/>
+                <a:solidFill>
+                  <a:schemeClr val="tx1"/>
+                </a:solidFill>
+                <a:hlinkClick r:id="rId3">
+                  <a:extLst>
+                    <a:ext uri="{A12FA001-AC4F-418D-AE19-62706E023703}">
+                      <ahyp:hlinkClr xmlns:ahyp="http://schemas.microsoft.com/office/drawing/2018/hyperlinkcolor" val="tx"/>
+                    </a:ext>
+                  </a:extLst>
+                </a:hlinkClick>
               </a:rPr>
               <a:t>https://zombono.com/</a:t>
             </a:r>
             <a:r>
-              <a:rPr lang="en-GB" sz="2400" dirty="0"/>
+              <a:rPr lang="en-GB" sz="2400" dirty="0">
+                <a:solidFill>
+                  <a:schemeClr val="tx1"/>
+                </a:solidFill>
+              </a:rPr>
               <a:t> </a:t>
             </a:r>
           </a:p>
@@ -2888,12 +2954,25 @@
           <a:p>
             <a:r>
               <a:rPr lang="en-GB" sz="2400" dirty="0">
-                <a:hlinkClick r:id="rId3"/>
+                <a:solidFill>
+                  <a:schemeClr val="tx1"/>
+                </a:solidFill>
+                <a:hlinkClick r:id="rId3">
+                  <a:extLst>
+                    <a:ext uri="{A12FA001-AC4F-418D-AE19-62706E023703}">
+                      <ahyp:hlinkClr xmlns:ahyp="http://schemas.microsoft.com/office/drawing/2018/hyperlinkcolor" val="tx"/>
+                    </a:ext>
+                  </a:extLst>
+                </a:hlinkClick>
               </a:rPr>
               <a:t>https://zombono.com/</a:t>
             </a:r>
             <a:r>
-              <a:rPr lang="en-GB" sz="2400" dirty="0"/>
+              <a:rPr lang="en-GB" sz="2400" dirty="0">
+                <a:solidFill>
+                  <a:schemeClr val="tx1"/>
+                </a:solidFill>
+              </a:rPr>
               <a:t> </a:t>
             </a:r>
           </a:p>
@@ -3145,12 +3224,25 @@
           <a:p>
             <a:r>
               <a:rPr lang="en-GB" sz="2400" dirty="0">
-                <a:hlinkClick r:id="rId3"/>
+                <a:solidFill>
+                  <a:schemeClr val="tx1"/>
+                </a:solidFill>
+                <a:hlinkClick r:id="rId3">
+                  <a:extLst>
+                    <a:ext uri="{A12FA001-AC4F-418D-AE19-62706E023703}">
+                      <ahyp:hlinkClr xmlns:ahyp="http://schemas.microsoft.com/office/drawing/2018/hyperlinkcolor" val="tx"/>
+                    </a:ext>
+                  </a:extLst>
+                </a:hlinkClick>
               </a:rPr>
               <a:t>https://zombono.com/</a:t>
             </a:r>
             <a:r>
-              <a:rPr lang="en-GB" sz="2400" dirty="0"/>
+              <a:rPr lang="en-GB" sz="2400" dirty="0">
+                <a:solidFill>
+                  <a:schemeClr val="tx1"/>
+                </a:solidFill>
+              </a:rPr>
               <a:t> </a:t>
             </a:r>
           </a:p>
@@ -3402,12 +3494,25 @@
           <a:p>
             <a:r>
               <a:rPr lang="en-GB" sz="2400" dirty="0">
-                <a:hlinkClick r:id="rId3"/>
+                <a:solidFill>
+                  <a:schemeClr val="tx1"/>
+                </a:solidFill>
+                <a:hlinkClick r:id="rId3">
+                  <a:extLst>
+                    <a:ext uri="{A12FA001-AC4F-418D-AE19-62706E023703}">
+                      <ahyp:hlinkClr xmlns:ahyp="http://schemas.microsoft.com/office/drawing/2018/hyperlinkcolor" val="tx"/>
+                    </a:ext>
+                  </a:extLst>
+                </a:hlinkClick>
               </a:rPr>
               <a:t>https://zombono.com/</a:t>
             </a:r>
             <a:r>
-              <a:rPr lang="en-GB" sz="2400" dirty="0"/>
+              <a:rPr lang="en-GB" sz="2400" dirty="0">
+                <a:solidFill>
+                  <a:schemeClr val="tx1"/>
+                </a:solidFill>
+              </a:rPr>
               <a:t> </a:t>
             </a:r>
           </a:p>
@@ -3665,12 +3770,25 @@
           <a:p>
             <a:r>
               <a:rPr lang="en-GB" sz="2400" dirty="0">
-                <a:hlinkClick r:id="rId3"/>
+                <a:solidFill>
+                  <a:schemeClr val="tx1"/>
+                </a:solidFill>
+                <a:hlinkClick r:id="rId3">
+                  <a:extLst>
+                    <a:ext uri="{A12FA001-AC4F-418D-AE19-62706E023703}">
+                      <ahyp:hlinkClr xmlns:ahyp="http://schemas.microsoft.com/office/drawing/2018/hyperlinkcolor" val="tx"/>
+                    </a:ext>
+                  </a:extLst>
+                </a:hlinkClick>
               </a:rPr>
               <a:t>https://zombono.com/</a:t>
             </a:r>
             <a:r>
-              <a:rPr lang="en-GB" sz="2400" dirty="0"/>
+              <a:rPr lang="en-GB" sz="2400" dirty="0">
+                <a:solidFill>
+                  <a:schemeClr val="tx1"/>
+                </a:solidFill>
+              </a:rPr>
               <a:t> </a:t>
             </a:r>
           </a:p>
@@ -3989,12 +4107,25 @@
           <a:p>
             <a:r>
               <a:rPr lang="en-GB" sz="2400" dirty="0">
-                <a:hlinkClick r:id="rId3"/>
+                <a:solidFill>
+                  <a:schemeClr val="tx1"/>
+                </a:solidFill>
+                <a:hlinkClick r:id="rId3">
+                  <a:extLst>
+                    <a:ext uri="{A12FA001-AC4F-418D-AE19-62706E023703}">
+                      <ahyp:hlinkClr xmlns:ahyp="http://schemas.microsoft.com/office/drawing/2018/hyperlinkcolor" val="tx"/>
+                    </a:ext>
+                  </a:extLst>
+                </a:hlinkClick>
               </a:rPr>
               <a:t>https://zombono.com/</a:t>
             </a:r>
             <a:r>
-              <a:rPr lang="en-GB" sz="2400" dirty="0"/>
+              <a:rPr lang="en-GB" sz="2400" dirty="0">
+                <a:solidFill>
+                  <a:schemeClr val="tx1"/>
+                </a:solidFill>
+              </a:rPr>
               <a:t> </a:t>
             </a:r>
           </a:p>
@@ -4300,12 +4431,25 @@
           <a:p>
             <a:r>
               <a:rPr lang="en-GB" sz="2400" dirty="0">
-                <a:hlinkClick r:id="rId3"/>
+                <a:solidFill>
+                  <a:schemeClr val="tx1"/>
+                </a:solidFill>
+                <a:hlinkClick r:id="rId3">
+                  <a:extLst>
+                    <a:ext uri="{A12FA001-AC4F-418D-AE19-62706E023703}">
+                      <ahyp:hlinkClr xmlns:ahyp="http://schemas.microsoft.com/office/drawing/2018/hyperlinkcolor" val="tx"/>
+                    </a:ext>
+                  </a:extLst>
+                </a:hlinkClick>
               </a:rPr>
               <a:t>https://zombono.com/</a:t>
             </a:r>
             <a:r>
-              <a:rPr lang="en-GB" sz="2400" dirty="0"/>
+              <a:rPr lang="en-GB" sz="2400" dirty="0">
+                <a:solidFill>
+                  <a:schemeClr val="tx1"/>
+                </a:solidFill>
+              </a:rPr>
               <a:t> </a:t>
             </a:r>
           </a:p>
@@ -4754,12 +4898,25 @@
           <a:p>
             <a:r>
               <a:rPr lang="en-GB" sz="2400" dirty="0">
-                <a:hlinkClick r:id="rId3"/>
+                <a:solidFill>
+                  <a:schemeClr val="tx1"/>
+                </a:solidFill>
+                <a:hlinkClick r:id="rId3">
+                  <a:extLst>
+                    <a:ext uri="{A12FA001-AC4F-418D-AE19-62706E023703}">
+                      <ahyp:hlinkClr xmlns:ahyp="http://schemas.microsoft.com/office/drawing/2018/hyperlinkcolor" val="tx"/>
+                    </a:ext>
+                  </a:extLst>
+                </a:hlinkClick>
               </a:rPr>
               <a:t>https://zombono.com/</a:t>
             </a:r>
             <a:r>
-              <a:rPr lang="en-GB" sz="2400" dirty="0"/>
+              <a:rPr lang="en-GB" sz="2400" dirty="0">
+                <a:solidFill>
+                  <a:schemeClr val="tx1"/>
+                </a:solidFill>
+              </a:rPr>
               <a:t> </a:t>
             </a:r>
           </a:p>
@@ -4954,12 +5111,25 @@
           <a:p>
             <a:r>
               <a:rPr lang="en-GB" sz="2400" dirty="0">
-                <a:hlinkClick r:id="rId3"/>
+                <a:solidFill>
+                  <a:schemeClr val="tx1"/>
+                </a:solidFill>
+                <a:hlinkClick r:id="rId3">
+                  <a:extLst>
+                    <a:ext uri="{A12FA001-AC4F-418D-AE19-62706E023703}">
+                      <ahyp:hlinkClr xmlns:ahyp="http://schemas.microsoft.com/office/drawing/2018/hyperlinkcolor" val="tx"/>
+                    </a:ext>
+                  </a:extLst>
+                </a:hlinkClick>
               </a:rPr>
               <a:t>https://zombono.com/</a:t>
             </a:r>
             <a:r>
-              <a:rPr lang="en-GB" sz="2400" dirty="0"/>
+              <a:rPr lang="en-GB" sz="2400" dirty="0">
+                <a:solidFill>
+                  <a:schemeClr val="tx1"/>
+                </a:solidFill>
+              </a:rPr>
               <a:t> </a:t>
             </a:r>
           </a:p>
@@ -5126,12 +5296,25 @@
           <a:p>
             <a:r>
               <a:rPr lang="en-GB" sz="2400" dirty="0">
-                <a:hlinkClick r:id="rId3"/>
+                <a:solidFill>
+                  <a:schemeClr val="tx1"/>
+                </a:solidFill>
+                <a:hlinkClick r:id="rId3">
+                  <a:extLst>
+                    <a:ext uri="{A12FA001-AC4F-418D-AE19-62706E023703}">
+                      <ahyp:hlinkClr xmlns:ahyp="http://schemas.microsoft.com/office/drawing/2018/hyperlinkcolor" val="tx"/>
+                    </a:ext>
+                  </a:extLst>
+                </a:hlinkClick>
               </a:rPr>
               <a:t>https://zombono.com/</a:t>
             </a:r>
             <a:r>
-              <a:rPr lang="en-GB" sz="2400" dirty="0"/>
+              <a:rPr lang="en-GB" sz="2400" dirty="0">
+                <a:solidFill>
+                  <a:schemeClr val="tx1"/>
+                </a:solidFill>
+              </a:rPr>
               <a:t> </a:t>
             </a:r>
           </a:p>
@@ -5458,12 +5641,25 @@
           <a:p>
             <a:r>
               <a:rPr lang="en-GB" sz="2400" dirty="0">
-                <a:hlinkClick r:id="rId3"/>
+                <a:solidFill>
+                  <a:schemeClr val="tx1"/>
+                </a:solidFill>
+                <a:hlinkClick r:id="rId3">
+                  <a:extLst>
+                    <a:ext uri="{A12FA001-AC4F-418D-AE19-62706E023703}">
+                      <ahyp:hlinkClr xmlns:ahyp="http://schemas.microsoft.com/office/drawing/2018/hyperlinkcolor" val="tx"/>
+                    </a:ext>
+                  </a:extLst>
+                </a:hlinkClick>
               </a:rPr>
               <a:t>https://zombono.com/</a:t>
             </a:r>
             <a:r>
-              <a:rPr lang="en-GB" sz="2400" dirty="0"/>
+              <a:rPr lang="en-GB" sz="2400" dirty="0">
+                <a:solidFill>
+                  <a:schemeClr val="tx1"/>
+                </a:solidFill>
+              </a:rPr>
               <a:t> </a:t>
             </a:r>
           </a:p>
@@ -5803,12 +5999,25 @@
           <a:p>
             <a:r>
               <a:rPr lang="en-GB" sz="2400" dirty="0">
-                <a:hlinkClick r:id="rId3"/>
+                <a:solidFill>
+                  <a:schemeClr val="tx1"/>
+                </a:solidFill>
+                <a:hlinkClick r:id="rId3">
+                  <a:extLst>
+                    <a:ext uri="{A12FA001-AC4F-418D-AE19-62706E023703}">
+                      <ahyp:hlinkClr xmlns:ahyp="http://schemas.microsoft.com/office/drawing/2018/hyperlinkcolor" val="tx"/>
+                    </a:ext>
+                  </a:extLst>
+                </a:hlinkClick>
               </a:rPr>
               <a:t>https://zombono.com/</a:t>
             </a:r>
             <a:r>
-              <a:rPr lang="en-GB" sz="2400" dirty="0"/>
+              <a:rPr lang="en-GB" sz="2400" dirty="0">
+                <a:solidFill>
+                  <a:schemeClr val="tx1"/>
+                </a:solidFill>
+              </a:rPr>
               <a:t> </a:t>
             </a:r>
           </a:p>
@@ -7118,6 +7327,104 @@
 </p:sld>
 </file>
 
+<file path=ppt/slides/slide10.xml><?xml version="1.0" encoding="utf-8"?>
+<p:sld xmlns:a="http://schemas.openxmlformats.org/drawingml/2006/main" xmlns:r="http://schemas.openxmlformats.org/officeDocument/2006/relationships" xmlns:p="http://schemas.openxmlformats.org/presentationml/2006/main">
+  <p:cSld>
+    <p:spTree>
+      <p:nvGrpSpPr>
+        <p:cNvPr id="1" name=""/>
+        <p:cNvGrpSpPr/>
+        <p:nvPr/>
+      </p:nvGrpSpPr>
+      <p:grpSpPr>
+        <a:xfrm>
+          <a:off x="0" y="0"/>
+          <a:ext cx="0" cy="0"/>
+          <a:chOff x="0" y="0"/>
+          <a:chExt cx="0" cy="0"/>
+        </a:xfrm>
+      </p:grpSpPr>
+      <p:sp>
+        <p:nvSpPr>
+          <p:cNvPr id="2" name="Title 1">
+            <a:extLst>
+              <a:ext uri="{FF2B5EF4-FFF2-40B4-BE49-F238E27FC236}">
+                <a16:creationId xmlns:a16="http://schemas.microsoft.com/office/drawing/2014/main" id="{D9E4EB12-C4E5-CA84-F5DC-0BFFB68BEDA5}"/>
+              </a:ext>
+            </a:extLst>
+          </p:cNvPr>
+          <p:cNvSpPr>
+            <a:spLocks noGrp="1"/>
+          </p:cNvSpPr>
+          <p:nvPr>
+            <p:ph type="title"/>
+          </p:nvPr>
+        </p:nvSpPr>
+        <p:spPr>
+          <a:xfrm>
+            <a:off x="677334" y="286228"/>
+            <a:ext cx="8596668" cy="628172"/>
+          </a:xfrm>
+        </p:spPr>
+        <p:txBody>
+          <a:bodyPr>
+            <a:normAutofit fontScale="90000"/>
+          </a:bodyPr>
+          <a:lstStyle/>
+          <a:p>
+            <a:r>
+              <a:rPr lang="en-GB" dirty="0"/>
+              <a:t>Now for the actual game…</a:t>
+            </a:r>
+          </a:p>
+        </p:txBody>
+      </p:sp>
+      <p:sp>
+        <p:nvSpPr>
+          <p:cNvPr id="3" name="Content Placeholder 2">
+            <a:extLst>
+              <a:ext uri="{FF2B5EF4-FFF2-40B4-BE49-F238E27FC236}">
+                <a16:creationId xmlns:a16="http://schemas.microsoft.com/office/drawing/2014/main" id="{BBBFA31E-F7E4-E1E1-B044-4009983AB838}"/>
+              </a:ext>
+            </a:extLst>
+          </p:cNvPr>
+          <p:cNvSpPr>
+            <a:spLocks noGrp="1"/>
+          </p:cNvSpPr>
+          <p:nvPr>
+            <p:ph idx="1"/>
+          </p:nvPr>
+        </p:nvSpPr>
+        <p:spPr>
+          <a:xfrm>
+            <a:off x="677334" y="914401"/>
+            <a:ext cx="8596668" cy="4803590"/>
+          </a:xfrm>
+        </p:spPr>
+        <p:txBody>
+          <a:bodyPr/>
+          <a:lstStyle/>
+          <a:p>
+            <a:r>
+              <a:rPr lang="en-GB" dirty="0"/>
+              <a:t>Best to play it to demo what it is</a:t>
+            </a:r>
+          </a:p>
+        </p:txBody>
+      </p:sp>
+    </p:spTree>
+    <p:extLst>
+      <p:ext uri="{BB962C8B-B14F-4D97-AF65-F5344CB8AC3E}">
+        <p14:creationId xmlns:p14="http://schemas.microsoft.com/office/powerpoint/2010/main" val="1609570957"/>
+      </p:ext>
+    </p:extLst>
+  </p:cSld>
+  <p:clrMapOvr>
+    <a:masterClrMapping/>
+  </p:clrMapOvr>
+</p:sld>
+</file>
+
 <file path=ppt/slides/slide2.xml><?xml version="1.0" encoding="utf-8"?>
 <p:sld xmlns:a="http://schemas.openxmlformats.org/drawingml/2006/main" xmlns:r="http://schemas.openxmlformats.org/officeDocument/2006/relationships" xmlns:p="http://schemas.openxmlformats.org/presentationml/2006/main">
   <p:cSld>
@@ -8281,11 +8588,71 @@
             <p:ph idx="1"/>
           </p:nvPr>
         </p:nvSpPr>
-        <p:spPr/>
+        <p:spPr>
+          <a:xfrm>
+            <a:off x="677334" y="959225"/>
+            <a:ext cx="8596668" cy="4758766"/>
+          </a:xfrm>
+        </p:spPr>
         <p:txBody>
           <a:bodyPr/>
           <a:lstStyle/>
           <a:p>
+            <a:r>
+              <a:rPr lang="en-GB" dirty="0"/>
+              <a:t>Level data is precalculated using binary space partitioning, culling is pre-calculated via “potentially visible set” algorithm and integrated into BSP, then the level gets lit</a:t>
+            </a:r>
+          </a:p>
+          <a:p>
+            <a:pPr lvl="1"/>
+            <a:r>
+              <a:rPr lang="en-GB" dirty="0"/>
+              <a:t>Takes time to “compile” levels and levels must be entirely sealed from the outside</a:t>
+            </a:r>
+          </a:p>
+          <a:p>
+            <a:pPr lvl="2"/>
+            <a:r>
+              <a:rPr lang="en-GB" dirty="0"/>
+              <a:t>Can be solved via just putting the skybox around the level</a:t>
+            </a:r>
+          </a:p>
+          <a:p>
+            <a:r>
+              <a:rPr lang="en-GB" dirty="0"/>
+              <a:t>Custom BSP format forked from original game BSP format</a:t>
+            </a:r>
+          </a:p>
+          <a:p>
+            <a:pPr lvl="1"/>
+            <a:r>
+              <a:rPr lang="en-GB" dirty="0"/>
+              <a:t>Numerous engine limits removed</a:t>
+            </a:r>
+          </a:p>
+          <a:p>
+            <a:pPr lvl="2"/>
+            <a:r>
+              <a:rPr lang="en-GB" dirty="0"/>
+              <a:t>Changed many shorts (used for packing float data in same 12.3 format and reducing file size) to float or int, so engines length </a:t>
+            </a:r>
+          </a:p>
+          <a:p>
+            <a:pPr lvl="2"/>
+            <a:r>
+              <a:rPr lang="en-GB" dirty="0"/>
+              <a:t>Removed useless “Pop” lump</a:t>
+            </a:r>
+          </a:p>
+          <a:p>
+            <a:pPr lvl="2"/>
+            <a:r>
+              <a:rPr lang="en-GB" dirty="0"/>
+              <a:t>Longer texture names</a:t>
+            </a:r>
+          </a:p>
+          <a:p>
+            <a:pPr lvl="2"/>
             <a:endParaRPr lang="en-GB" dirty="0"/>
           </a:p>
         </p:txBody>
@@ -8320,70 +8687,67 @@
           <a:chExt cx="0" cy="0"/>
         </a:xfrm>
       </p:grpSpPr>
-      <p:sp>
-        <p:nvSpPr>
-          <p:cNvPr id="2" name="Title 1">
+      <p:pic>
+        <p:nvPicPr>
+          <p:cNvPr id="5" name="Picture 4">
             <a:extLst>
               <a:ext uri="{FF2B5EF4-FFF2-40B4-BE49-F238E27FC236}">
-                <a16:creationId xmlns:a16="http://schemas.microsoft.com/office/drawing/2014/main" id="{D9E4EB12-C4E5-CA84-F5DC-0BFFB68BEDA5}"/>
+                <a16:creationId xmlns:a16="http://schemas.microsoft.com/office/drawing/2014/main" id="{C50050C1-01EF-BFEC-E8B0-153FDB263234}"/>
               </a:ext>
             </a:extLst>
           </p:cNvPr>
-          <p:cNvSpPr>
-            <a:spLocks noGrp="1"/>
-          </p:cNvSpPr>
-          <p:nvPr>
-            <p:ph type="title"/>
-          </p:nvPr>
-        </p:nvSpPr>
-        <p:spPr>
-          <a:xfrm>
-            <a:off x="677334" y="286228"/>
-            <a:ext cx="8596668" cy="628172"/>
-          </a:xfrm>
-        </p:spPr>
-        <p:txBody>
-          <a:bodyPr>
-            <a:normAutofit fontScale="90000"/>
-          </a:bodyPr>
-          <a:lstStyle/>
-          <a:p>
-            <a:r>
-              <a:rPr lang="en-GB" dirty="0"/>
-              <a:t>Now for the actual game…</a:t>
-            </a:r>
-          </a:p>
-        </p:txBody>
-      </p:sp>
-      <p:sp>
-        <p:nvSpPr>
-          <p:cNvPr id="3" name="Content Placeholder 2">
+          <p:cNvPicPr>
+            <a:picLocks noChangeAspect="1"/>
+          </p:cNvPicPr>
+          <p:nvPr/>
+        </p:nvPicPr>
+        <p:blipFill>
+          <a:blip r:embed="rId2"/>
+          <a:stretch>
+            <a:fillRect/>
+          </a:stretch>
+        </p:blipFill>
+        <p:spPr>
+          <a:xfrm>
+            <a:off x="1698309" y="187708"/>
+            <a:ext cx="6414750" cy="5001755"/>
+          </a:xfrm>
+          <a:prstGeom prst="rect">
+            <a:avLst/>
+          </a:prstGeom>
+        </p:spPr>
+      </p:pic>
+      <p:sp>
+        <p:nvSpPr>
+          <p:cNvPr id="7" name="TextBox 6">
             <a:extLst>
               <a:ext uri="{FF2B5EF4-FFF2-40B4-BE49-F238E27FC236}">
-                <a16:creationId xmlns:a16="http://schemas.microsoft.com/office/drawing/2014/main" id="{BBBFA31E-F7E4-E1E1-B044-4009983AB838}"/>
+                <a16:creationId xmlns:a16="http://schemas.microsoft.com/office/drawing/2014/main" id="{2A3E40B5-4A61-5019-C7C8-A57D09187A5D}"/>
               </a:ext>
             </a:extLst>
           </p:cNvPr>
-          <p:cNvSpPr>
-            <a:spLocks noGrp="1"/>
-          </p:cNvSpPr>
-          <p:nvPr>
-            <p:ph idx="1"/>
-          </p:nvPr>
-        </p:nvSpPr>
-        <p:spPr>
-          <a:xfrm>
-            <a:off x="677334" y="914401"/>
-            <a:ext cx="8596668" cy="4803590"/>
-          </a:xfrm>
-        </p:spPr>
-        <p:txBody>
-          <a:bodyPr/>
-          <a:lstStyle/>
-          <a:p>
-            <a:r>
-              <a:rPr lang="en-GB" dirty="0"/>
-              <a:t>Best to play it to demo what it is</a:t>
+          <p:cNvSpPr txBox="1"/>
+          <p:nvPr/>
+        </p:nvSpPr>
+        <p:spPr>
+          <a:xfrm>
+            <a:off x="2982444" y="5189463"/>
+            <a:ext cx="3971985" cy="369332"/>
+          </a:xfrm>
+          <a:prstGeom prst="rect">
+            <a:avLst/>
+          </a:prstGeom>
+          <a:noFill/>
+        </p:spPr>
+        <p:txBody>
+          <a:bodyPr wrap="none" rtlCol="0">
+            <a:spAutoFit/>
+          </a:bodyPr>
+          <a:lstStyle/>
+          <a:p>
+            <a:r>
+              <a:rPr lang="en-GB" i="1" dirty="0"/>
+              <a:t>A big map (for illustrative purposes)</a:t>
             </a:r>
           </a:p>
         </p:txBody>
@@ -8391,7 +8755,7 @@
     </p:spTree>
     <p:extLst>
       <p:ext uri="{BB962C8B-B14F-4D97-AF65-F5344CB8AC3E}">
-        <p14:creationId xmlns:p14="http://schemas.microsoft.com/office/powerpoint/2010/main" val="1609570957"/>
+        <p14:creationId xmlns:p14="http://schemas.microsoft.com/office/powerpoint/2010/main" val="3424588711"/>
       </p:ext>
     </p:extLst>
   </p:cSld>

</xml_diff>